<commit_message>
Presentation + images 1 Modification de la presentation alors que j'ecrivais le precedent commit ; elle y est listee. Ajout de l'image utilisee pour le R-tree (Wikipedia, page du R-Tree) et du logo de l'ENSG en .png
</commit_message>
<xml_diff>
--- a/doc/presentationCopil/presentationVersion22Mars.pptx
+++ b/doc/presentationCopil/presentationVersion22Mars.pptx
@@ -23910,7 +23910,27 @@
                   </a:schemeClr>
                 </a:solidFill>
               </a:rPr>
-              <a:t>diagramme de classes </a:t>
+              <a:t>D</a:t>
+            </a:r>
+            <a:r>
+              <a:rPr lang="fr-FR" dirty="0" smtClean="0">
+                <a:solidFill>
+                  <a:schemeClr val="accent3">
+                    <a:lumMod val="50000"/>
+                  </a:schemeClr>
+                </a:solidFill>
+              </a:rPr>
+              <a:t>iagramme </a:t>
+            </a:r>
+            <a:r>
+              <a:rPr lang="fr-FR" dirty="0">
+                <a:solidFill>
+                  <a:schemeClr val="accent3">
+                    <a:lumMod val="50000"/>
+                  </a:schemeClr>
+                </a:solidFill>
+              </a:rPr>
+              <a:t>de classes </a:t>
             </a:r>
             <a:endParaRPr lang="fr-FR" sz="2700" dirty="0">
               <a:solidFill>

</xml_diff>

<commit_message>
Bibliographie sur QGLViewer et Glut Dernier version de la presentation Nouveau logo
</commit_message>
<xml_diff>
--- a/doc/presentationCopil/presentationVersion22Mars.pptx
+++ b/doc/presentationCopil/presentationVersion22Mars.pptx
@@ -12,10 +12,10 @@
     <p:sldMasterId id="2147483766" r:id="rId8"/>
   </p:sldMasterIdLst>
   <p:notesMasterIdLst>
-    <p:notesMasterId r:id="rId28"/>
+    <p:notesMasterId r:id="rId29"/>
   </p:notesMasterIdLst>
   <p:handoutMasterIdLst>
-    <p:handoutMasterId r:id="rId29"/>
+    <p:handoutMasterId r:id="rId30"/>
   </p:handoutMasterIdLst>
   <p:sldIdLst>
     <p:sldId id="310" r:id="rId9"/>
@@ -28,15 +28,16 @@
     <p:sldId id="265" r:id="rId16"/>
     <p:sldId id="289" r:id="rId17"/>
     <p:sldId id="290" r:id="rId18"/>
-    <p:sldId id="291" r:id="rId19"/>
-    <p:sldId id="286" r:id="rId20"/>
-    <p:sldId id="308" r:id="rId21"/>
-    <p:sldId id="294" r:id="rId22"/>
-    <p:sldId id="303" r:id="rId23"/>
-    <p:sldId id="285" r:id="rId24"/>
-    <p:sldId id="304" r:id="rId25"/>
-    <p:sldId id="307" r:id="rId26"/>
-    <p:sldId id="302" r:id="rId27"/>
+    <p:sldId id="311" r:id="rId19"/>
+    <p:sldId id="291" r:id="rId20"/>
+    <p:sldId id="286" r:id="rId21"/>
+    <p:sldId id="308" r:id="rId22"/>
+    <p:sldId id="294" r:id="rId23"/>
+    <p:sldId id="303" r:id="rId24"/>
+    <p:sldId id="285" r:id="rId25"/>
+    <p:sldId id="304" r:id="rId26"/>
+    <p:sldId id="307" r:id="rId27"/>
+    <p:sldId id="302" r:id="rId28"/>
   </p:sldIdLst>
   <p:sldSz cx="9144000" cy="6858000" type="screen4x3"/>
   <p:notesSz cx="6858000" cy="9144000"/>
@@ -137,7 +138,7 @@
   </p:defaultTextStyle>
   <p:extLst>
     <p:ext uri="{521415D9-36F7-43E2-AB2F-B90AF26B5E84}">
-      <p14:sectionLst xmlns="" xmlns:p14="http://schemas.microsoft.com/office/powerpoint/2010/main">
+      <p14:sectionLst xmlns:p14="http://schemas.microsoft.com/office/powerpoint/2010/main" xmlns="">
         <p14:section name="Section par défaut" id="{6EAE38B5-2588-4045-945D-F9657AE88E76}">
           <p14:sldIdLst>
             <p14:sldId id="301"/>
@@ -167,10 +168,10 @@
       </p14:sectionLst>
     </p:ext>
     <p:ext uri="{EFAFB233-063F-42B5-8137-9DF3F51BA10A}">
-      <p15:sldGuideLst xmlns="" xmlns:p15="http://schemas.microsoft.com/office/powerpoint/2012/main"/>
+      <p15:sldGuideLst xmlns:p15="http://schemas.microsoft.com/office/powerpoint/2012/main" xmlns=""/>
     </p:ext>
     <p:ext uri="{2D200454-40CA-4A62-9FC3-DE9A4176ACB9}">
-      <p15:notesGuideLst xmlns="" xmlns:p15="http://schemas.microsoft.com/office/powerpoint/2012/main"/>
+      <p15:notesGuideLst xmlns:p15="http://schemas.microsoft.com/office/powerpoint/2012/main" xmlns=""/>
     </p:ext>
   </p:extLst>
 </p:presentation>
@@ -259,7 +260,7 @@
             <a:fld id="{5E8C758F-8F07-403C-AAD9-D1770A0D36CA}" type="datetimeFigureOut">
               <a:rPr lang="fr-FR" smtClean="0"/>
               <a:pPr/>
-              <a:t>23/03/2015</a:t>
+              <a:t>24/03/2015</a:t>
             </a:fld>
             <a:endParaRPr lang="fr-FR"/>
           </a:p>
@@ -335,7 +336,7 @@
     </p:spTree>
     <p:extLst>
       <p:ext uri="{BB962C8B-B14F-4D97-AF65-F5344CB8AC3E}">
-        <p14:creationId xmlns="" xmlns:p14="http://schemas.microsoft.com/office/powerpoint/2010/main" val="245211346"/>
+        <p14:creationId xmlns:p14="http://schemas.microsoft.com/office/powerpoint/2010/main" xmlns="" val="245211346"/>
       </p:ext>
     </p:extLst>
   </p:cSld>
@@ -426,7 +427,7 @@
             <a:fld id="{B9B9BE96-BA76-4200-812F-A8239A37214B}" type="datetimeFigureOut">
               <a:rPr lang="fr-FR" smtClean="0"/>
               <a:pPr/>
-              <a:t>23/03/2015</a:t>
+              <a:t>24/03/2015</a:t>
             </a:fld>
             <a:endParaRPr lang="fr-FR"/>
           </a:p>
@@ -595,7 +596,7 @@
     </p:spTree>
     <p:extLst>
       <p:ext uri="{BB962C8B-B14F-4D97-AF65-F5344CB8AC3E}">
-        <p14:creationId xmlns="" xmlns:p14="http://schemas.microsoft.com/office/powerpoint/2010/main" val="2496755425"/>
+        <p14:creationId xmlns:p14="http://schemas.microsoft.com/office/powerpoint/2010/main" xmlns="" val="2496755425"/>
       </p:ext>
     </p:extLst>
   </p:cSld>
@@ -775,7 +776,7 @@
     </p:spTree>
     <p:extLst>
       <p:ext uri="{BB962C8B-B14F-4D97-AF65-F5344CB8AC3E}">
-        <p14:creationId xmlns="" xmlns:p14="http://schemas.microsoft.com/office/powerpoint/2010/main" val="4159321522"/>
+        <p14:creationId xmlns:p14="http://schemas.microsoft.com/office/powerpoint/2010/main" xmlns="" val="4159321522"/>
       </p:ext>
     </p:extLst>
   </p:cSld>
@@ -865,7 +866,7 @@
     </p:spTree>
     <p:extLst>
       <p:ext uri="{BB962C8B-B14F-4D97-AF65-F5344CB8AC3E}">
-        <p14:creationId xmlns="" xmlns:p14="http://schemas.microsoft.com/office/powerpoint/2010/main" val="2616446012"/>
+        <p14:creationId xmlns:p14="http://schemas.microsoft.com/office/powerpoint/2010/main" xmlns="" val="2616446012"/>
       </p:ext>
     </p:extLst>
   </p:cSld>
@@ -1100,7 +1101,7 @@
             <a:fld id="{67CECCD7-22E7-4EC2-A4CB-540BF85E41A4}" type="slidenum">
               <a:rPr lang="fr-FR" smtClean="0"/>
               <a:pPr/>
-              <a:t>17</a:t>
+              <a:t>18</a:t>
             </a:fld>
             <a:endParaRPr lang="fr-FR"/>
           </a:p>
@@ -1109,7 +1110,7 @@
     </p:spTree>
     <p:extLst>
       <p:ext uri="{BB962C8B-B14F-4D97-AF65-F5344CB8AC3E}">
-        <p14:creationId xmlns="" xmlns:p14="http://schemas.microsoft.com/office/powerpoint/2010/main" val="1643535083"/>
+        <p14:creationId xmlns:p14="http://schemas.microsoft.com/office/powerpoint/2010/main" xmlns="" val="1643535083"/>
       </p:ext>
     </p:extLst>
   </p:cSld>
@@ -1250,7 +1251,7 @@
           <a:blip r:embed="rId2" cstate="print">
             <a:extLst>
               <a:ext uri="{28A0092B-C50C-407E-A947-70E740481C1C}">
-                <a14:useLocalDpi xmlns="" xmlns:a14="http://schemas.microsoft.com/office/drawing/2010/main" val="0"/>
+                <a14:useLocalDpi xmlns:a14="http://schemas.microsoft.com/office/drawing/2010/main" xmlns="" val="0"/>
               </a:ext>
             </a:extLst>
           </a:blip>
@@ -1271,7 +1272,7 @@
     </p:spTree>
     <p:extLst>
       <p:ext uri="{BB962C8B-B14F-4D97-AF65-F5344CB8AC3E}">
-        <p14:creationId xmlns="" xmlns:p14="http://schemas.microsoft.com/office/powerpoint/2010/main" val="1377303641"/>
+        <p14:creationId xmlns:p14="http://schemas.microsoft.com/office/powerpoint/2010/main" xmlns="" val="1377303641"/>
       </p:ext>
     </p:extLst>
   </p:cSld>
@@ -1391,7 +1392,7 @@
             <a:fld id="{5E09256A-1089-4A56-BE8A-73B40807B663}" type="datetimeFigureOut">
               <a:rPr lang="fr-FR" smtClean="0"/>
               <a:pPr/>
-              <a:t>23/03/2015</a:t>
+              <a:t>24/03/2015</a:t>
             </a:fld>
             <a:endParaRPr lang="fr-FR"/>
           </a:p>
@@ -1443,7 +1444,7 @@
     </p:spTree>
     <p:extLst>
       <p:ext uri="{BB962C8B-B14F-4D97-AF65-F5344CB8AC3E}">
-        <p14:creationId xmlns="" xmlns:p14="http://schemas.microsoft.com/office/powerpoint/2010/main" val="327049382"/>
+        <p14:creationId xmlns:p14="http://schemas.microsoft.com/office/powerpoint/2010/main" xmlns="" val="327049382"/>
       </p:ext>
     </p:extLst>
   </p:cSld>
@@ -1579,7 +1580,7 @@
                 </a:solidFill>
               </a:rPr>
               <a:pPr/>
-              <a:t>23/03/2015</a:t>
+              <a:t>24/03/2015</a:t>
             </a:fld>
             <a:endParaRPr lang="fr-FR">
               <a:solidFill>
@@ -1655,7 +1656,7 @@
     </p:spTree>
     <p:extLst>
       <p:ext uri="{BB962C8B-B14F-4D97-AF65-F5344CB8AC3E}">
-        <p14:creationId xmlns="" xmlns:p14="http://schemas.microsoft.com/office/powerpoint/2010/main" val="2164200178"/>
+        <p14:creationId xmlns:p14="http://schemas.microsoft.com/office/powerpoint/2010/main" xmlns="" val="2164200178"/>
       </p:ext>
     </p:extLst>
   </p:cSld>
@@ -1785,7 +1786,7 @@
             <a:fld id="{5E09256A-1089-4A56-BE8A-73B40807B663}" type="datetimeFigureOut">
               <a:rPr lang="fr-FR" smtClean="0"/>
               <a:pPr/>
-              <a:t>23/03/2015</a:t>
+              <a:t>24/03/2015</a:t>
             </a:fld>
             <a:endParaRPr lang="fr-FR"/>
           </a:p>
@@ -1837,7 +1838,7 @@
     </p:spTree>
     <p:extLst>
       <p:ext uri="{BB962C8B-B14F-4D97-AF65-F5344CB8AC3E}">
-        <p14:creationId xmlns="" xmlns:p14="http://schemas.microsoft.com/office/powerpoint/2010/main" val="1987300022"/>
+        <p14:creationId xmlns:p14="http://schemas.microsoft.com/office/powerpoint/2010/main" xmlns="" val="1987300022"/>
       </p:ext>
     </p:extLst>
   </p:cSld>
@@ -1876,7 +1877,7 @@
           <a:blip r:embed="rId2" cstate="print">
             <a:extLst>
               <a:ext uri="{28A0092B-C50C-407E-A947-70E740481C1C}">
-                <a14:useLocalDpi xmlns="" xmlns:a14="http://schemas.microsoft.com/office/drawing/2010/main" val="0"/>
+                <a14:useLocalDpi xmlns:a14="http://schemas.microsoft.com/office/drawing/2010/main" xmlns="" val="0"/>
               </a:ext>
             </a:extLst>
           </a:blip>
@@ -1897,7 +1898,7 @@
     </p:spTree>
     <p:extLst>
       <p:ext uri="{BB962C8B-B14F-4D97-AF65-F5344CB8AC3E}">
-        <p14:creationId xmlns="" xmlns:p14="http://schemas.microsoft.com/office/powerpoint/2010/main" val="3063023148"/>
+        <p14:creationId xmlns:p14="http://schemas.microsoft.com/office/powerpoint/2010/main" xmlns="" val="3063023148"/>
       </p:ext>
     </p:extLst>
   </p:cSld>
@@ -2064,7 +2065,7 @@
     </p:spTree>
     <p:extLst>
       <p:ext uri="{BB962C8B-B14F-4D97-AF65-F5344CB8AC3E}">
-        <p14:creationId xmlns="" xmlns:p14="http://schemas.microsoft.com/office/powerpoint/2010/main" val="1464393562"/>
+        <p14:creationId xmlns:p14="http://schemas.microsoft.com/office/powerpoint/2010/main" xmlns="" val="1464393562"/>
       </p:ext>
     </p:extLst>
   </p:cSld>
@@ -2189,7 +2190,7 @@
           <a:blip r:embed="rId2" cstate="print">
             <a:extLst>
               <a:ext uri="{28A0092B-C50C-407E-A947-70E740481C1C}">
-                <a14:useLocalDpi xmlns="" xmlns:a14="http://schemas.microsoft.com/office/drawing/2010/main" val="0"/>
+                <a14:useLocalDpi xmlns:a14="http://schemas.microsoft.com/office/drawing/2010/main" xmlns="" val="0"/>
               </a:ext>
             </a:extLst>
           </a:blip>
@@ -2210,7 +2211,7 @@
     </p:spTree>
     <p:extLst>
       <p:ext uri="{BB962C8B-B14F-4D97-AF65-F5344CB8AC3E}">
-        <p14:creationId xmlns="" xmlns:p14="http://schemas.microsoft.com/office/powerpoint/2010/main" val="4027857640"/>
+        <p14:creationId xmlns:p14="http://schemas.microsoft.com/office/powerpoint/2010/main" xmlns="" val="4027857640"/>
       </p:ext>
     </p:extLst>
   </p:cSld>
@@ -2439,7 +2440,7 @@
     </p:spTree>
     <p:extLst>
       <p:ext uri="{BB962C8B-B14F-4D97-AF65-F5344CB8AC3E}">
-        <p14:creationId xmlns="" xmlns:p14="http://schemas.microsoft.com/office/powerpoint/2010/main" val="1458027670"/>
+        <p14:creationId xmlns:p14="http://schemas.microsoft.com/office/powerpoint/2010/main" xmlns="" val="1458027670"/>
       </p:ext>
     </p:extLst>
   </p:cSld>
@@ -2803,7 +2804,7 @@
     </p:spTree>
     <p:extLst>
       <p:ext uri="{BB962C8B-B14F-4D97-AF65-F5344CB8AC3E}">
-        <p14:creationId xmlns="" xmlns:p14="http://schemas.microsoft.com/office/powerpoint/2010/main" val="1695836590"/>
+        <p14:creationId xmlns:p14="http://schemas.microsoft.com/office/powerpoint/2010/main" xmlns="" val="1695836590"/>
       </p:ext>
     </p:extLst>
   </p:cSld>
@@ -2918,7 +2919,7 @@
     </p:spTree>
     <p:extLst>
       <p:ext uri="{BB962C8B-B14F-4D97-AF65-F5344CB8AC3E}">
-        <p14:creationId xmlns="" xmlns:p14="http://schemas.microsoft.com/office/powerpoint/2010/main" val="900954417"/>
+        <p14:creationId xmlns:p14="http://schemas.microsoft.com/office/powerpoint/2010/main" xmlns="" val="900954417"/>
       </p:ext>
     </p:extLst>
   </p:cSld>
@@ -3036,7 +3037,7 @@
           <a:blip r:embed="rId2" cstate="print">
             <a:extLst>
               <a:ext uri="{28A0092B-C50C-407E-A947-70E740481C1C}">
-                <a14:useLocalDpi xmlns="" xmlns:a14="http://schemas.microsoft.com/office/drawing/2010/main" val="0"/>
+                <a14:useLocalDpi xmlns:a14="http://schemas.microsoft.com/office/drawing/2010/main" xmlns="" val="0"/>
               </a:ext>
             </a:extLst>
           </a:blip>
@@ -3057,7 +3058,7 @@
     </p:spTree>
     <p:extLst>
       <p:ext uri="{BB962C8B-B14F-4D97-AF65-F5344CB8AC3E}">
-        <p14:creationId xmlns="" xmlns:p14="http://schemas.microsoft.com/office/powerpoint/2010/main" val="3133479235"/>
+        <p14:creationId xmlns:p14="http://schemas.microsoft.com/office/powerpoint/2010/main" xmlns="" val="3133479235"/>
       </p:ext>
     </p:extLst>
   </p:cSld>
@@ -3331,7 +3332,7 @@
     </p:spTree>
     <p:extLst>
       <p:ext uri="{BB962C8B-B14F-4D97-AF65-F5344CB8AC3E}">
-        <p14:creationId xmlns="" xmlns:p14="http://schemas.microsoft.com/office/powerpoint/2010/main" val="177904087"/>
+        <p14:creationId xmlns:p14="http://schemas.microsoft.com/office/powerpoint/2010/main" xmlns="" val="177904087"/>
       </p:ext>
     </p:extLst>
   </p:cSld>
@@ -3451,7 +3452,7 @@
             <a:fld id="{5E09256A-1089-4A56-BE8A-73B40807B663}" type="datetimeFigureOut">
               <a:rPr lang="fr-FR" smtClean="0"/>
               <a:pPr/>
-              <a:t>23/03/2015</a:t>
+              <a:t>24/03/2015</a:t>
             </a:fld>
             <a:endParaRPr lang="fr-FR"/>
           </a:p>
@@ -3503,7 +3504,7 @@
     </p:spTree>
     <p:extLst>
       <p:ext uri="{BB962C8B-B14F-4D97-AF65-F5344CB8AC3E}">
-        <p14:creationId xmlns="" xmlns:p14="http://schemas.microsoft.com/office/powerpoint/2010/main" val="2785978734"/>
+        <p14:creationId xmlns:p14="http://schemas.microsoft.com/office/powerpoint/2010/main" xmlns="" val="2785978734"/>
       </p:ext>
     </p:extLst>
   </p:cSld>
@@ -3753,7 +3754,7 @@
     </p:spTree>
     <p:extLst>
       <p:ext uri="{BB962C8B-B14F-4D97-AF65-F5344CB8AC3E}">
-        <p14:creationId xmlns="" xmlns:p14="http://schemas.microsoft.com/office/powerpoint/2010/main" val="3990043070"/>
+        <p14:creationId xmlns:p14="http://schemas.microsoft.com/office/powerpoint/2010/main" xmlns="" val="3990043070"/>
       </p:ext>
     </p:extLst>
   </p:cSld>
@@ -3920,7 +3921,7 @@
     </p:spTree>
     <p:extLst>
       <p:ext uri="{BB962C8B-B14F-4D97-AF65-F5344CB8AC3E}">
-        <p14:creationId xmlns="" xmlns:p14="http://schemas.microsoft.com/office/powerpoint/2010/main" val="3492131731"/>
+        <p14:creationId xmlns:p14="http://schemas.microsoft.com/office/powerpoint/2010/main" xmlns="" val="3492131731"/>
       </p:ext>
     </p:extLst>
   </p:cSld>
@@ -4097,7 +4098,7 @@
     </p:spTree>
     <p:extLst>
       <p:ext uri="{BB962C8B-B14F-4D97-AF65-F5344CB8AC3E}">
-        <p14:creationId xmlns="" xmlns:p14="http://schemas.microsoft.com/office/powerpoint/2010/main" val="848828135"/>
+        <p14:creationId xmlns:p14="http://schemas.microsoft.com/office/powerpoint/2010/main" xmlns="" val="848828135"/>
       </p:ext>
     </p:extLst>
   </p:cSld>
@@ -4233,7 +4234,7 @@
           <a:blip r:embed="rId2" cstate="print">
             <a:extLst>
               <a:ext uri="{28A0092B-C50C-407E-A947-70E740481C1C}">
-                <a14:useLocalDpi xmlns="" xmlns:a14="http://schemas.microsoft.com/office/drawing/2010/main" val="0"/>
+                <a14:useLocalDpi xmlns:a14="http://schemas.microsoft.com/office/drawing/2010/main" xmlns="" val="0"/>
               </a:ext>
             </a:extLst>
           </a:blip>
@@ -4254,7 +4255,7 @@
     </p:spTree>
     <p:extLst>
       <p:ext uri="{BB962C8B-B14F-4D97-AF65-F5344CB8AC3E}">
-        <p14:creationId xmlns="" xmlns:p14="http://schemas.microsoft.com/office/powerpoint/2010/main" val="3549583916"/>
+        <p14:creationId xmlns:p14="http://schemas.microsoft.com/office/powerpoint/2010/main" xmlns="" val="3549583916"/>
       </p:ext>
     </p:extLst>
   </p:cSld>
@@ -4421,7 +4422,7 @@
     </p:spTree>
     <p:extLst>
       <p:ext uri="{BB962C8B-B14F-4D97-AF65-F5344CB8AC3E}">
-        <p14:creationId xmlns="" xmlns:p14="http://schemas.microsoft.com/office/powerpoint/2010/main" val="836886836"/>
+        <p14:creationId xmlns:p14="http://schemas.microsoft.com/office/powerpoint/2010/main" xmlns="" val="836886836"/>
       </p:ext>
     </p:extLst>
   </p:cSld>
@@ -4664,7 +4665,7 @@
     </p:spTree>
     <p:extLst>
       <p:ext uri="{BB962C8B-B14F-4D97-AF65-F5344CB8AC3E}">
-        <p14:creationId xmlns="" xmlns:p14="http://schemas.microsoft.com/office/powerpoint/2010/main" val="4213357796"/>
+        <p14:creationId xmlns:p14="http://schemas.microsoft.com/office/powerpoint/2010/main" xmlns="" val="4213357796"/>
       </p:ext>
     </p:extLst>
   </p:cSld>
@@ -4893,7 +4894,7 @@
     </p:spTree>
     <p:extLst>
       <p:ext uri="{BB962C8B-B14F-4D97-AF65-F5344CB8AC3E}">
-        <p14:creationId xmlns="" xmlns:p14="http://schemas.microsoft.com/office/powerpoint/2010/main" val="397131324"/>
+        <p14:creationId xmlns:p14="http://schemas.microsoft.com/office/powerpoint/2010/main" xmlns="" val="397131324"/>
       </p:ext>
     </p:extLst>
   </p:cSld>
@@ -5257,7 +5258,7 @@
     </p:spTree>
     <p:extLst>
       <p:ext uri="{BB962C8B-B14F-4D97-AF65-F5344CB8AC3E}">
-        <p14:creationId xmlns="" xmlns:p14="http://schemas.microsoft.com/office/powerpoint/2010/main" val="829484019"/>
+        <p14:creationId xmlns:p14="http://schemas.microsoft.com/office/powerpoint/2010/main" xmlns="" val="829484019"/>
       </p:ext>
     </p:extLst>
   </p:cSld>
@@ -5372,7 +5373,7 @@
     </p:spTree>
     <p:extLst>
       <p:ext uri="{BB962C8B-B14F-4D97-AF65-F5344CB8AC3E}">
-        <p14:creationId xmlns="" xmlns:p14="http://schemas.microsoft.com/office/powerpoint/2010/main" val="1388208549"/>
+        <p14:creationId xmlns:p14="http://schemas.microsoft.com/office/powerpoint/2010/main" xmlns="" val="1388208549"/>
       </p:ext>
     </p:extLst>
   </p:cSld>
@@ -5498,7 +5499,7 @@
           <a:blip r:embed="rId2" cstate="print">
             <a:extLst>
               <a:ext uri="{28A0092B-C50C-407E-A947-70E740481C1C}">
-                <a14:useLocalDpi xmlns="" xmlns:a14="http://schemas.microsoft.com/office/drawing/2010/main" val="0"/>
+                <a14:useLocalDpi xmlns:a14="http://schemas.microsoft.com/office/drawing/2010/main" xmlns="" val="0"/>
               </a:ext>
             </a:extLst>
           </a:blip>
@@ -5519,7 +5520,7 @@
     </p:spTree>
     <p:extLst>
       <p:ext uri="{BB962C8B-B14F-4D97-AF65-F5344CB8AC3E}">
-        <p14:creationId xmlns="" xmlns:p14="http://schemas.microsoft.com/office/powerpoint/2010/main" val="1947952352"/>
+        <p14:creationId xmlns:p14="http://schemas.microsoft.com/office/powerpoint/2010/main" xmlns="" val="1947952352"/>
       </p:ext>
     </p:extLst>
   </p:cSld>
@@ -5715,7 +5716,7 @@
             <a:fld id="{5E09256A-1089-4A56-BE8A-73B40807B663}" type="datetimeFigureOut">
               <a:rPr lang="fr-FR" smtClean="0"/>
               <a:pPr/>
-              <a:t>23/03/2015</a:t>
+              <a:t>24/03/2015</a:t>
             </a:fld>
             <a:endParaRPr lang="fr-FR"/>
           </a:p>
@@ -5767,7 +5768,7 @@
     </p:spTree>
     <p:extLst>
       <p:ext uri="{BB962C8B-B14F-4D97-AF65-F5344CB8AC3E}">
-        <p14:creationId xmlns="" xmlns:p14="http://schemas.microsoft.com/office/powerpoint/2010/main" val="3939361029"/>
+        <p14:creationId xmlns:p14="http://schemas.microsoft.com/office/powerpoint/2010/main" xmlns="" val="3939361029"/>
       </p:ext>
     </p:extLst>
   </p:cSld>
@@ -6041,7 +6042,7 @@
     </p:spTree>
     <p:extLst>
       <p:ext uri="{BB962C8B-B14F-4D97-AF65-F5344CB8AC3E}">
-        <p14:creationId xmlns="" xmlns:p14="http://schemas.microsoft.com/office/powerpoint/2010/main" val="2733522873"/>
+        <p14:creationId xmlns:p14="http://schemas.microsoft.com/office/powerpoint/2010/main" xmlns="" val="2733522873"/>
       </p:ext>
     </p:extLst>
   </p:cSld>
@@ -6291,7 +6292,7 @@
     </p:spTree>
     <p:extLst>
       <p:ext uri="{BB962C8B-B14F-4D97-AF65-F5344CB8AC3E}">
-        <p14:creationId xmlns="" xmlns:p14="http://schemas.microsoft.com/office/powerpoint/2010/main" val="1707117535"/>
+        <p14:creationId xmlns:p14="http://schemas.microsoft.com/office/powerpoint/2010/main" xmlns="" val="1707117535"/>
       </p:ext>
     </p:extLst>
   </p:cSld>
@@ -6458,7 +6459,7 @@
     </p:spTree>
     <p:extLst>
       <p:ext uri="{BB962C8B-B14F-4D97-AF65-F5344CB8AC3E}">
-        <p14:creationId xmlns="" xmlns:p14="http://schemas.microsoft.com/office/powerpoint/2010/main" val="2482134345"/>
+        <p14:creationId xmlns:p14="http://schemas.microsoft.com/office/powerpoint/2010/main" xmlns="" val="2482134345"/>
       </p:ext>
     </p:extLst>
   </p:cSld>
@@ -6635,7 +6636,7 @@
     </p:spTree>
     <p:extLst>
       <p:ext uri="{BB962C8B-B14F-4D97-AF65-F5344CB8AC3E}">
-        <p14:creationId xmlns="" xmlns:p14="http://schemas.microsoft.com/office/powerpoint/2010/main" val="3784356909"/>
+        <p14:creationId xmlns:p14="http://schemas.microsoft.com/office/powerpoint/2010/main" xmlns="" val="3784356909"/>
       </p:ext>
     </p:extLst>
   </p:cSld>
@@ -6777,7 +6778,7 @@
             <a:fld id="{C764DE79-268F-4C1A-8933-263129D2AF90}" type="datetimeFigureOut">
               <a:rPr lang="en-US" dirty="0"/>
               <a:pPr/>
-              <a:t>3/23/2015</a:t>
+              <a:t>3/24/2015</a:t>
             </a:fld>
             <a:endParaRPr lang="en-US" dirty="0"/>
           </a:p>
@@ -6829,7 +6830,7 @@
     </p:spTree>
     <p:extLst>
       <p:ext uri="{BB962C8B-B14F-4D97-AF65-F5344CB8AC3E}">
-        <p14:creationId xmlns="" xmlns:p14="http://schemas.microsoft.com/office/powerpoint/2010/main" val="3323517563"/>
+        <p14:creationId xmlns:p14="http://schemas.microsoft.com/office/powerpoint/2010/main" xmlns="" val="3323517563"/>
       </p:ext>
     </p:extLst>
   </p:cSld>
@@ -6950,7 +6951,7 @@
             <a:fld id="{C764DE79-268F-4C1A-8933-263129D2AF90}" type="datetimeFigureOut">
               <a:rPr lang="en-US" dirty="0"/>
               <a:pPr/>
-              <a:t>3/23/2015</a:t>
+              <a:t>3/24/2015</a:t>
             </a:fld>
             <a:endParaRPr lang="en-US" dirty="0"/>
           </a:p>
@@ -7002,7 +7003,7 @@
     </p:spTree>
     <p:extLst>
       <p:ext uri="{BB962C8B-B14F-4D97-AF65-F5344CB8AC3E}">
-        <p14:creationId xmlns="" xmlns:p14="http://schemas.microsoft.com/office/powerpoint/2010/main" val="415017301"/>
+        <p14:creationId xmlns:p14="http://schemas.microsoft.com/office/powerpoint/2010/main" xmlns="" val="415017301"/>
       </p:ext>
     </p:extLst>
   </p:cSld>
@@ -7197,7 +7198,7 @@
             <a:fld id="{C764DE79-268F-4C1A-8933-263129D2AF90}" type="datetimeFigureOut">
               <a:rPr lang="en-US" dirty="0"/>
               <a:pPr/>
-              <a:t>3/23/2015</a:t>
+              <a:t>3/24/2015</a:t>
             </a:fld>
             <a:endParaRPr lang="en-US" dirty="0"/>
           </a:p>
@@ -7249,7 +7250,7 @@
     </p:spTree>
     <p:extLst>
       <p:ext uri="{BB962C8B-B14F-4D97-AF65-F5344CB8AC3E}">
-        <p14:creationId xmlns="" xmlns:p14="http://schemas.microsoft.com/office/powerpoint/2010/main" val="654532717"/>
+        <p14:creationId xmlns:p14="http://schemas.microsoft.com/office/powerpoint/2010/main" xmlns="" val="654532717"/>
       </p:ext>
     </p:extLst>
   </p:cSld>
@@ -7432,7 +7433,7 @@
             <a:fld id="{C764DE79-268F-4C1A-8933-263129D2AF90}" type="datetimeFigureOut">
               <a:rPr lang="en-US" dirty="0"/>
               <a:pPr/>
-              <a:t>3/23/2015</a:t>
+              <a:t>3/24/2015</a:t>
             </a:fld>
             <a:endParaRPr lang="en-US" dirty="0"/>
           </a:p>
@@ -7484,7 +7485,7 @@
     </p:spTree>
     <p:extLst>
       <p:ext uri="{BB962C8B-B14F-4D97-AF65-F5344CB8AC3E}">
-        <p14:creationId xmlns="" xmlns:p14="http://schemas.microsoft.com/office/powerpoint/2010/main" val="2691403435"/>
+        <p14:creationId xmlns:p14="http://schemas.microsoft.com/office/powerpoint/2010/main" xmlns="" val="2691403435"/>
       </p:ext>
     </p:extLst>
   </p:cSld>
@@ -7802,7 +7803,7 @@
             <a:fld id="{C764DE79-268F-4C1A-8933-263129D2AF90}" type="datetimeFigureOut">
               <a:rPr lang="en-US" dirty="0"/>
               <a:pPr/>
-              <a:t>3/23/2015</a:t>
+              <a:t>3/24/2015</a:t>
             </a:fld>
             <a:endParaRPr lang="en-US" dirty="0"/>
           </a:p>
@@ -7854,7 +7855,7 @@
     </p:spTree>
     <p:extLst>
       <p:ext uri="{BB962C8B-B14F-4D97-AF65-F5344CB8AC3E}">
-        <p14:creationId xmlns="" xmlns:p14="http://schemas.microsoft.com/office/powerpoint/2010/main" val="3066499524"/>
+        <p14:creationId xmlns:p14="http://schemas.microsoft.com/office/powerpoint/2010/main" xmlns="" val="3066499524"/>
       </p:ext>
     </p:extLst>
   </p:cSld>
@@ -7923,7 +7924,7 @@
             <a:fld id="{C764DE79-268F-4C1A-8933-263129D2AF90}" type="datetimeFigureOut">
               <a:rPr lang="en-US" dirty="0"/>
               <a:pPr/>
-              <a:t>3/23/2015</a:t>
+              <a:t>3/24/2015</a:t>
             </a:fld>
             <a:endParaRPr lang="en-US" dirty="0"/>
           </a:p>
@@ -7975,7 +7976,7 @@
     </p:spTree>
     <p:extLst>
       <p:ext uri="{BB962C8B-B14F-4D97-AF65-F5344CB8AC3E}">
-        <p14:creationId xmlns="" xmlns:p14="http://schemas.microsoft.com/office/powerpoint/2010/main" val="3129546640"/>
+        <p14:creationId xmlns:p14="http://schemas.microsoft.com/office/powerpoint/2010/main" xmlns="" val="3129546640"/>
       </p:ext>
     </p:extLst>
   </p:cSld>
@@ -8158,7 +8159,7 @@
             <a:fld id="{5E09256A-1089-4A56-BE8A-73B40807B663}" type="datetimeFigureOut">
               <a:rPr lang="fr-FR" smtClean="0"/>
               <a:pPr/>
-              <a:t>23/03/2015</a:t>
+              <a:t>24/03/2015</a:t>
             </a:fld>
             <a:endParaRPr lang="fr-FR"/>
           </a:p>
@@ -8210,7 +8211,7 @@
     </p:spTree>
     <p:extLst>
       <p:ext uri="{BB962C8B-B14F-4D97-AF65-F5344CB8AC3E}">
-        <p14:creationId xmlns="" xmlns:p14="http://schemas.microsoft.com/office/powerpoint/2010/main" val="3051829991"/>
+        <p14:creationId xmlns:p14="http://schemas.microsoft.com/office/powerpoint/2010/main" xmlns="" val="3051829991"/>
       </p:ext>
     </p:extLst>
   </p:cSld>
@@ -8255,7 +8256,7 @@
             <a:fld id="{C764DE79-268F-4C1A-8933-263129D2AF90}" type="datetimeFigureOut">
               <a:rPr lang="en-US" dirty="0"/>
               <a:pPr/>
-              <a:t>3/23/2015</a:t>
+              <a:t>3/24/2015</a:t>
             </a:fld>
             <a:endParaRPr lang="en-US" dirty="0"/>
           </a:p>
@@ -8307,7 +8308,7 @@
     </p:spTree>
     <p:extLst>
       <p:ext uri="{BB962C8B-B14F-4D97-AF65-F5344CB8AC3E}">
-        <p14:creationId xmlns="" xmlns:p14="http://schemas.microsoft.com/office/powerpoint/2010/main" val="3156983909"/>
+        <p14:creationId xmlns:p14="http://schemas.microsoft.com/office/powerpoint/2010/main" xmlns="" val="3156983909"/>
       </p:ext>
     </p:extLst>
   </p:cSld>
@@ -8535,7 +8536,7 @@
             <a:fld id="{C764DE79-268F-4C1A-8933-263129D2AF90}" type="datetimeFigureOut">
               <a:rPr lang="en-US" dirty="0"/>
               <a:pPr/>
-              <a:t>3/23/2015</a:t>
+              <a:t>3/24/2015</a:t>
             </a:fld>
             <a:endParaRPr lang="en-US" dirty="0"/>
           </a:p>
@@ -8587,7 +8588,7 @@
     </p:spTree>
     <p:extLst>
       <p:ext uri="{BB962C8B-B14F-4D97-AF65-F5344CB8AC3E}">
-        <p14:creationId xmlns="" xmlns:p14="http://schemas.microsoft.com/office/powerpoint/2010/main" val="1426224555"/>
+        <p14:creationId xmlns:p14="http://schemas.microsoft.com/office/powerpoint/2010/main" xmlns="" val="1426224555"/>
       </p:ext>
     </p:extLst>
   </p:cSld>
@@ -8795,7 +8796,7 @@
             <a:fld id="{C764DE79-268F-4C1A-8933-263129D2AF90}" type="datetimeFigureOut">
               <a:rPr lang="en-US" dirty="0"/>
               <a:pPr/>
-              <a:t>3/23/2015</a:t>
+              <a:t>3/24/2015</a:t>
             </a:fld>
             <a:endParaRPr lang="en-US" dirty="0"/>
           </a:p>
@@ -8847,7 +8848,7 @@
     </p:spTree>
     <p:extLst>
       <p:ext uri="{BB962C8B-B14F-4D97-AF65-F5344CB8AC3E}">
-        <p14:creationId xmlns="" xmlns:p14="http://schemas.microsoft.com/office/powerpoint/2010/main" val="1038055528"/>
+        <p14:creationId xmlns:p14="http://schemas.microsoft.com/office/powerpoint/2010/main" xmlns="" val="1038055528"/>
       </p:ext>
     </p:extLst>
   </p:cSld>
@@ -8968,7 +8969,7 @@
             <a:fld id="{C764DE79-268F-4C1A-8933-263129D2AF90}" type="datetimeFigureOut">
               <a:rPr lang="en-US" dirty="0"/>
               <a:pPr/>
-              <a:t>3/23/2015</a:t>
+              <a:t>3/24/2015</a:t>
             </a:fld>
             <a:endParaRPr lang="en-US" dirty="0"/>
           </a:p>
@@ -9020,7 +9021,7 @@
     </p:spTree>
     <p:extLst>
       <p:ext uri="{BB962C8B-B14F-4D97-AF65-F5344CB8AC3E}">
-        <p14:creationId xmlns="" xmlns:p14="http://schemas.microsoft.com/office/powerpoint/2010/main" val="1204363044"/>
+        <p14:creationId xmlns:p14="http://schemas.microsoft.com/office/powerpoint/2010/main" xmlns="" val="1204363044"/>
       </p:ext>
     </p:extLst>
   </p:cSld>
@@ -9198,7 +9199,7 @@
     </p:spTree>
     <p:extLst>
       <p:ext uri="{BB962C8B-B14F-4D97-AF65-F5344CB8AC3E}">
-        <p14:creationId xmlns="" xmlns:p14="http://schemas.microsoft.com/office/powerpoint/2010/main" val="783380910"/>
+        <p14:creationId xmlns:p14="http://schemas.microsoft.com/office/powerpoint/2010/main" xmlns="" val="783380910"/>
       </p:ext>
     </p:extLst>
   </p:cSld>
@@ -9368,7 +9369,7 @@
           <a:blip r:embed="rId2" cstate="print">
             <a:extLst>
               <a:ext uri="{28A0092B-C50C-407E-A947-70E740481C1C}">
-                <a14:useLocalDpi xmlns="" xmlns:a14="http://schemas.microsoft.com/office/drawing/2010/main" val="0"/>
+                <a14:useLocalDpi xmlns:a14="http://schemas.microsoft.com/office/drawing/2010/main" xmlns="" val="0"/>
               </a:ext>
             </a:extLst>
           </a:blip>
@@ -9389,7 +9390,7 @@
     </p:spTree>
     <p:extLst>
       <p:ext uri="{BB962C8B-B14F-4D97-AF65-F5344CB8AC3E}">
-        <p14:creationId xmlns="" xmlns:p14="http://schemas.microsoft.com/office/powerpoint/2010/main" val="3524597106"/>
+        <p14:creationId xmlns:p14="http://schemas.microsoft.com/office/powerpoint/2010/main" xmlns="" val="3524597106"/>
       </p:ext>
     </p:extLst>
   </p:cSld>
@@ -9515,7 +9516,7 @@
           <a:blip r:embed="rId2" cstate="print">
             <a:extLst>
               <a:ext uri="{28A0092B-C50C-407E-A947-70E740481C1C}">
-                <a14:useLocalDpi xmlns="" xmlns:a14="http://schemas.microsoft.com/office/drawing/2010/main" val="0"/>
+                <a14:useLocalDpi xmlns:a14="http://schemas.microsoft.com/office/drawing/2010/main" xmlns="" val="0"/>
               </a:ext>
             </a:extLst>
           </a:blip>
@@ -9536,7 +9537,7 @@
     </p:spTree>
     <p:extLst>
       <p:ext uri="{BB962C8B-B14F-4D97-AF65-F5344CB8AC3E}">
-        <p14:creationId xmlns="" xmlns:p14="http://schemas.microsoft.com/office/powerpoint/2010/main" val="1982174821"/>
+        <p14:creationId xmlns:p14="http://schemas.microsoft.com/office/powerpoint/2010/main" xmlns="" val="1982174821"/>
       </p:ext>
     </p:extLst>
   </p:cSld>
@@ -9662,7 +9663,7 @@
           <a:blip r:embed="rId2" cstate="print">
             <a:extLst>
               <a:ext uri="{28A0092B-C50C-407E-A947-70E740481C1C}">
-                <a14:useLocalDpi xmlns="" xmlns:a14="http://schemas.microsoft.com/office/drawing/2010/main" val="0"/>
+                <a14:useLocalDpi xmlns:a14="http://schemas.microsoft.com/office/drawing/2010/main" xmlns="" val="0"/>
               </a:ext>
             </a:extLst>
           </a:blip>
@@ -9683,7 +9684,7 @@
     </p:spTree>
     <p:extLst>
       <p:ext uri="{BB962C8B-B14F-4D97-AF65-F5344CB8AC3E}">
-        <p14:creationId xmlns="" xmlns:p14="http://schemas.microsoft.com/office/powerpoint/2010/main" val="2231671042"/>
+        <p14:creationId xmlns:p14="http://schemas.microsoft.com/office/powerpoint/2010/main" xmlns="" val="2231671042"/>
       </p:ext>
     </p:extLst>
   </p:cSld>
@@ -9817,7 +9818,7 @@
           <a:blip r:embed="rId2" cstate="print">
             <a:extLst>
               <a:ext uri="{28A0092B-C50C-407E-A947-70E740481C1C}">
-                <a14:useLocalDpi xmlns="" xmlns:a14="http://schemas.microsoft.com/office/drawing/2010/main" val="0"/>
+                <a14:useLocalDpi xmlns:a14="http://schemas.microsoft.com/office/drawing/2010/main" xmlns="" val="0"/>
               </a:ext>
             </a:extLst>
           </a:blip>
@@ -9838,7 +9839,7 @@
     </p:spTree>
     <p:extLst>
       <p:ext uri="{BB962C8B-B14F-4D97-AF65-F5344CB8AC3E}">
-        <p14:creationId xmlns="" xmlns:p14="http://schemas.microsoft.com/office/powerpoint/2010/main" val="549659058"/>
+        <p14:creationId xmlns:p14="http://schemas.microsoft.com/office/powerpoint/2010/main" xmlns="" val="549659058"/>
       </p:ext>
     </p:extLst>
   </p:cSld>
@@ -9938,15 +9939,7 @@
             <a:pPr algn="ctr"/>
             <a:r>
               <a:rPr lang="fr-FR" sz="2700" b="1" dirty="0" smtClean="0"/>
-              <a:t>Solution </a:t>
-            </a:r>
-            <a:r>
-              <a:rPr lang="fr-FR" sz="2700" b="1" dirty="0" smtClean="0"/>
-              <a:t>technique : </a:t>
-            </a:r>
-            <a:r>
-              <a:rPr lang="fr-FR" sz="2700" b="1" dirty="0" smtClean="0"/>
-              <a:t>choix du langage</a:t>
+              <a:t>Solution technique : choix du langage</a:t>
             </a:r>
             <a:endParaRPr lang="fr-FR" sz="2700" b="1" dirty="0"/>
           </a:p>
@@ -9955,7 +9948,7 @@
     </p:spTree>
     <p:extLst>
       <p:ext uri="{BB962C8B-B14F-4D97-AF65-F5344CB8AC3E}">
-        <p14:creationId xmlns="" xmlns:p14="http://schemas.microsoft.com/office/powerpoint/2010/main" val="1113161695"/>
+        <p14:creationId xmlns:p14="http://schemas.microsoft.com/office/powerpoint/2010/main" xmlns="" val="1113161695"/>
       </p:ext>
     </p:extLst>
   </p:cSld>
@@ -10272,7 +10265,7 @@
             <a:fld id="{5E09256A-1089-4A56-BE8A-73B40807B663}" type="datetimeFigureOut">
               <a:rPr lang="fr-FR" smtClean="0"/>
               <a:pPr/>
-              <a:t>23/03/2015</a:t>
+              <a:t>24/03/2015</a:t>
             </a:fld>
             <a:endParaRPr lang="fr-FR"/>
           </a:p>
@@ -10324,7 +10317,7 @@
     </p:spTree>
     <p:extLst>
       <p:ext uri="{BB962C8B-B14F-4D97-AF65-F5344CB8AC3E}">
-        <p14:creationId xmlns="" xmlns:p14="http://schemas.microsoft.com/office/powerpoint/2010/main" val="3542999607"/>
+        <p14:creationId xmlns:p14="http://schemas.microsoft.com/office/powerpoint/2010/main" xmlns="" val="3542999607"/>
       </p:ext>
     </p:extLst>
   </p:cSld>
@@ -10363,7 +10356,7 @@
           <a:blip r:embed="rId2" cstate="print">
             <a:extLst>
               <a:ext uri="{28A0092B-C50C-407E-A947-70E740481C1C}">
-                <a14:useLocalDpi xmlns="" xmlns:a14="http://schemas.microsoft.com/office/drawing/2010/main" val="0"/>
+                <a14:useLocalDpi xmlns:a14="http://schemas.microsoft.com/office/drawing/2010/main" xmlns="" val="0"/>
               </a:ext>
             </a:extLst>
           </a:blip>
@@ -10384,7 +10377,7 @@
     </p:spTree>
     <p:extLst>
       <p:ext uri="{BB962C8B-B14F-4D97-AF65-F5344CB8AC3E}">
-        <p14:creationId xmlns="" xmlns:p14="http://schemas.microsoft.com/office/powerpoint/2010/main" val="1703324518"/>
+        <p14:creationId xmlns:p14="http://schemas.microsoft.com/office/powerpoint/2010/main" xmlns="" val="1703324518"/>
       </p:ext>
     </p:extLst>
   </p:cSld>
@@ -10518,7 +10511,7 @@
           <a:blip r:embed="rId2" cstate="print">
             <a:extLst>
               <a:ext uri="{28A0092B-C50C-407E-A947-70E740481C1C}">
-                <a14:useLocalDpi xmlns="" xmlns:a14="http://schemas.microsoft.com/office/drawing/2010/main" val="0"/>
+                <a14:useLocalDpi xmlns:a14="http://schemas.microsoft.com/office/drawing/2010/main" xmlns="" val="0"/>
               </a:ext>
             </a:extLst>
           </a:blip>
@@ -10539,7 +10532,7 @@
     </p:spTree>
     <p:extLst>
       <p:ext uri="{BB962C8B-B14F-4D97-AF65-F5344CB8AC3E}">
-        <p14:creationId xmlns="" xmlns:p14="http://schemas.microsoft.com/office/powerpoint/2010/main" val="989642567"/>
+        <p14:creationId xmlns:p14="http://schemas.microsoft.com/office/powerpoint/2010/main" xmlns="" val="989642567"/>
       </p:ext>
     </p:extLst>
   </p:cSld>
@@ -10624,7 +10617,7 @@
     </p:spTree>
     <p:extLst>
       <p:ext uri="{BB962C8B-B14F-4D97-AF65-F5344CB8AC3E}">
-        <p14:creationId xmlns="" xmlns:p14="http://schemas.microsoft.com/office/powerpoint/2010/main" val="3008703252"/>
+        <p14:creationId xmlns:p14="http://schemas.microsoft.com/office/powerpoint/2010/main" xmlns="" val="3008703252"/>
       </p:ext>
     </p:extLst>
   </p:cSld>
@@ -10746,7 +10739,7 @@
           <a:blip r:embed="rId2" cstate="print">
             <a:extLst>
               <a:ext uri="{28A0092B-C50C-407E-A947-70E740481C1C}">
-                <a14:useLocalDpi xmlns="" xmlns:a14="http://schemas.microsoft.com/office/drawing/2010/main" val="0"/>
+                <a14:useLocalDpi xmlns:a14="http://schemas.microsoft.com/office/drawing/2010/main" xmlns="" val="0"/>
               </a:ext>
             </a:extLst>
           </a:blip>
@@ -10767,7 +10760,7 @@
     </p:spTree>
     <p:extLst>
       <p:ext uri="{BB962C8B-B14F-4D97-AF65-F5344CB8AC3E}">
-        <p14:creationId xmlns="" xmlns:p14="http://schemas.microsoft.com/office/powerpoint/2010/main" val="246811586"/>
+        <p14:creationId xmlns:p14="http://schemas.microsoft.com/office/powerpoint/2010/main" xmlns="" val="246811586"/>
       </p:ext>
     </p:extLst>
   </p:cSld>
@@ -10876,7 +10869,7 @@
     </p:spTree>
     <p:extLst>
       <p:ext uri="{BB962C8B-B14F-4D97-AF65-F5344CB8AC3E}">
-        <p14:creationId xmlns="" xmlns:p14="http://schemas.microsoft.com/office/powerpoint/2010/main" val="287620348"/>
+        <p14:creationId xmlns:p14="http://schemas.microsoft.com/office/powerpoint/2010/main" xmlns="" val="287620348"/>
       </p:ext>
     </p:extLst>
   </p:cSld>
@@ -11025,7 +11018,7 @@
             <a:fld id="{5E09256A-1089-4A56-BE8A-73B40807B663}" type="datetimeFigureOut">
               <a:rPr lang="fr-FR" smtClean="0"/>
               <a:pPr/>
-              <a:t>23/03/2015</a:t>
+              <a:t>24/03/2015</a:t>
             </a:fld>
             <a:endParaRPr lang="fr-FR"/>
           </a:p>
@@ -11077,7 +11070,7 @@
     </p:spTree>
     <p:extLst>
       <p:ext uri="{BB962C8B-B14F-4D97-AF65-F5344CB8AC3E}">
-        <p14:creationId xmlns="" xmlns:p14="http://schemas.microsoft.com/office/powerpoint/2010/main" val="1704035460"/>
+        <p14:creationId xmlns:p14="http://schemas.microsoft.com/office/powerpoint/2010/main" xmlns="" val="1704035460"/>
       </p:ext>
     </p:extLst>
   </p:cSld>
@@ -11197,7 +11190,7 @@
             <a:fld id="{5E09256A-1089-4A56-BE8A-73B40807B663}" type="datetimeFigureOut">
               <a:rPr lang="fr-FR" smtClean="0"/>
               <a:pPr/>
-              <a:t>23/03/2015</a:t>
+              <a:t>24/03/2015</a:t>
             </a:fld>
             <a:endParaRPr lang="fr-FR"/>
           </a:p>
@@ -11249,7 +11242,7 @@
     </p:spTree>
     <p:extLst>
       <p:ext uri="{BB962C8B-B14F-4D97-AF65-F5344CB8AC3E}">
-        <p14:creationId xmlns="" xmlns:p14="http://schemas.microsoft.com/office/powerpoint/2010/main" val="3482190967"/>
+        <p14:creationId xmlns:p14="http://schemas.microsoft.com/office/powerpoint/2010/main" xmlns="" val="3482190967"/>
       </p:ext>
     </p:extLst>
   </p:cSld>
@@ -11443,7 +11436,7 @@
             <a:fld id="{5E09256A-1089-4A56-BE8A-73B40807B663}" type="datetimeFigureOut">
               <a:rPr lang="fr-FR" smtClean="0"/>
               <a:pPr/>
-              <a:t>23/03/2015</a:t>
+              <a:t>24/03/2015</a:t>
             </a:fld>
             <a:endParaRPr lang="fr-FR"/>
           </a:p>
@@ -11495,7 +11488,7 @@
     </p:spTree>
     <p:extLst>
       <p:ext uri="{BB962C8B-B14F-4D97-AF65-F5344CB8AC3E}">
-        <p14:creationId xmlns="" xmlns:p14="http://schemas.microsoft.com/office/powerpoint/2010/main" val="3533161511"/>
+        <p14:creationId xmlns:p14="http://schemas.microsoft.com/office/powerpoint/2010/main" xmlns="" val="3533161511"/>
       </p:ext>
     </p:extLst>
   </p:cSld>
@@ -11677,7 +11670,7 @@
             <a:fld id="{5E09256A-1089-4A56-BE8A-73B40807B663}" type="datetimeFigureOut">
               <a:rPr lang="fr-FR" smtClean="0"/>
               <a:pPr/>
-              <a:t>23/03/2015</a:t>
+              <a:t>24/03/2015</a:t>
             </a:fld>
             <a:endParaRPr lang="fr-FR"/>
           </a:p>
@@ -11729,7 +11722,7 @@
     </p:spTree>
     <p:extLst>
       <p:ext uri="{BB962C8B-B14F-4D97-AF65-F5344CB8AC3E}">
-        <p14:creationId xmlns="" xmlns:p14="http://schemas.microsoft.com/office/powerpoint/2010/main" val="3404668591"/>
+        <p14:creationId xmlns:p14="http://schemas.microsoft.com/office/powerpoint/2010/main" xmlns="" val="3404668591"/>
       </p:ext>
     </p:extLst>
   </p:cSld>
@@ -12046,7 +12039,7 @@
             <a:fld id="{5E09256A-1089-4A56-BE8A-73B40807B663}" type="datetimeFigureOut">
               <a:rPr lang="fr-FR" smtClean="0"/>
               <a:pPr/>
-              <a:t>23/03/2015</a:t>
+              <a:t>24/03/2015</a:t>
             </a:fld>
             <a:endParaRPr lang="fr-FR"/>
           </a:p>
@@ -12098,7 +12091,7 @@
     </p:spTree>
     <p:extLst>
       <p:ext uri="{BB962C8B-B14F-4D97-AF65-F5344CB8AC3E}">
-        <p14:creationId xmlns="" xmlns:p14="http://schemas.microsoft.com/office/powerpoint/2010/main" val="3142318575"/>
+        <p14:creationId xmlns:p14="http://schemas.microsoft.com/office/powerpoint/2010/main" xmlns="" val="3142318575"/>
       </p:ext>
     </p:extLst>
   </p:cSld>
@@ -12166,7 +12159,7 @@
             <a:fld id="{5E09256A-1089-4A56-BE8A-73B40807B663}" type="datetimeFigureOut">
               <a:rPr lang="fr-FR" smtClean="0"/>
               <a:pPr/>
-              <a:t>23/03/2015</a:t>
+              <a:t>24/03/2015</a:t>
             </a:fld>
             <a:endParaRPr lang="fr-FR"/>
           </a:p>
@@ -12218,7 +12211,7 @@
     </p:spTree>
     <p:extLst>
       <p:ext uri="{BB962C8B-B14F-4D97-AF65-F5344CB8AC3E}">
-        <p14:creationId xmlns="" xmlns:p14="http://schemas.microsoft.com/office/powerpoint/2010/main" val="2182218349"/>
+        <p14:creationId xmlns:p14="http://schemas.microsoft.com/office/powerpoint/2010/main" xmlns="" val="2182218349"/>
       </p:ext>
     </p:extLst>
   </p:cSld>
@@ -12286,7 +12279,7 @@
             <a:fld id="{5E09256A-1089-4A56-BE8A-73B40807B663}" type="datetimeFigureOut">
               <a:rPr lang="fr-FR" smtClean="0"/>
               <a:pPr/>
-              <a:t>23/03/2015</a:t>
+              <a:t>24/03/2015</a:t>
             </a:fld>
             <a:endParaRPr lang="fr-FR"/>
           </a:p>
@@ -12338,7 +12331,7 @@
     </p:spTree>
     <p:extLst>
       <p:ext uri="{BB962C8B-B14F-4D97-AF65-F5344CB8AC3E}">
-        <p14:creationId xmlns="" xmlns:p14="http://schemas.microsoft.com/office/powerpoint/2010/main" val="2643584523"/>
+        <p14:creationId xmlns:p14="http://schemas.microsoft.com/office/powerpoint/2010/main" xmlns="" val="2643584523"/>
       </p:ext>
     </p:extLst>
   </p:cSld>
@@ -12383,7 +12376,7 @@
             <a:fld id="{5E09256A-1089-4A56-BE8A-73B40807B663}" type="datetimeFigureOut">
               <a:rPr lang="fr-FR" smtClean="0"/>
               <a:pPr/>
-              <a:t>23/03/2015</a:t>
+              <a:t>24/03/2015</a:t>
             </a:fld>
             <a:endParaRPr lang="fr-FR"/>
           </a:p>
@@ -12435,7 +12428,7 @@
     </p:spTree>
     <p:extLst>
       <p:ext uri="{BB962C8B-B14F-4D97-AF65-F5344CB8AC3E}">
-        <p14:creationId xmlns="" xmlns:p14="http://schemas.microsoft.com/office/powerpoint/2010/main" val="2850118849"/>
+        <p14:creationId xmlns:p14="http://schemas.microsoft.com/office/powerpoint/2010/main" xmlns="" val="2850118849"/>
       </p:ext>
     </p:extLst>
   </p:cSld>
@@ -12662,7 +12655,7 @@
             <a:fld id="{5E09256A-1089-4A56-BE8A-73B40807B663}" type="datetimeFigureOut">
               <a:rPr lang="fr-FR" smtClean="0"/>
               <a:pPr/>
-              <a:t>23/03/2015</a:t>
+              <a:t>24/03/2015</a:t>
             </a:fld>
             <a:endParaRPr lang="fr-FR"/>
           </a:p>
@@ -12714,7 +12707,7 @@
     </p:spTree>
     <p:extLst>
       <p:ext uri="{BB962C8B-B14F-4D97-AF65-F5344CB8AC3E}">
-        <p14:creationId xmlns="" xmlns:p14="http://schemas.microsoft.com/office/powerpoint/2010/main" val="4049702780"/>
+        <p14:creationId xmlns:p14="http://schemas.microsoft.com/office/powerpoint/2010/main" xmlns="" val="4049702780"/>
       </p:ext>
     </p:extLst>
   </p:cSld>
@@ -12921,7 +12914,7 @@
             <a:fld id="{5E09256A-1089-4A56-BE8A-73B40807B663}" type="datetimeFigureOut">
               <a:rPr lang="fr-FR" smtClean="0"/>
               <a:pPr/>
-              <a:t>23/03/2015</a:t>
+              <a:t>24/03/2015</a:t>
             </a:fld>
             <a:endParaRPr lang="fr-FR"/>
           </a:p>
@@ -12973,7 +12966,7 @@
     </p:spTree>
     <p:extLst>
       <p:ext uri="{BB962C8B-B14F-4D97-AF65-F5344CB8AC3E}">
-        <p14:creationId xmlns="" xmlns:p14="http://schemas.microsoft.com/office/powerpoint/2010/main" val="3951175354"/>
+        <p14:creationId xmlns:p14="http://schemas.microsoft.com/office/powerpoint/2010/main" xmlns="" val="3951175354"/>
       </p:ext>
     </p:extLst>
   </p:cSld>
@@ -13093,7 +13086,7 @@
             <a:fld id="{5E09256A-1089-4A56-BE8A-73B40807B663}" type="datetimeFigureOut">
               <a:rPr lang="fr-FR" smtClean="0"/>
               <a:pPr/>
-              <a:t>23/03/2015</a:t>
+              <a:t>24/03/2015</a:t>
             </a:fld>
             <a:endParaRPr lang="fr-FR"/>
           </a:p>
@@ -13145,7 +13138,7 @@
     </p:spTree>
     <p:extLst>
       <p:ext uri="{BB962C8B-B14F-4D97-AF65-F5344CB8AC3E}">
-        <p14:creationId xmlns="" xmlns:p14="http://schemas.microsoft.com/office/powerpoint/2010/main" val="89907821"/>
+        <p14:creationId xmlns:p14="http://schemas.microsoft.com/office/powerpoint/2010/main" xmlns="" val="89907821"/>
       </p:ext>
     </p:extLst>
   </p:cSld>
@@ -13275,7 +13268,7 @@
             <a:fld id="{5E09256A-1089-4A56-BE8A-73B40807B663}" type="datetimeFigureOut">
               <a:rPr lang="fr-FR" smtClean="0"/>
               <a:pPr/>
-              <a:t>23/03/2015</a:t>
+              <a:t>24/03/2015</a:t>
             </a:fld>
             <a:endParaRPr lang="fr-FR"/>
           </a:p>
@@ -13327,7 +13320,7 @@
     </p:spTree>
     <p:extLst>
       <p:ext uri="{BB962C8B-B14F-4D97-AF65-F5344CB8AC3E}">
-        <p14:creationId xmlns="" xmlns:p14="http://schemas.microsoft.com/office/powerpoint/2010/main" val="343423466"/>
+        <p14:creationId xmlns:p14="http://schemas.microsoft.com/office/powerpoint/2010/main" xmlns="" val="343423466"/>
       </p:ext>
     </p:extLst>
   </p:cSld>
@@ -13450,15 +13443,7 @@
             </a:r>
             <a:r>
               <a:rPr lang="fr-FR" sz="2700" b="1" baseline="0" dirty="0" smtClean="0"/>
-              <a:t> </a:t>
-            </a:r>
-            <a:r>
-              <a:rPr lang="fr-FR" sz="2700" b="1" baseline="0" dirty="0" smtClean="0"/>
-              <a:t>technique : </a:t>
-            </a:r>
-            <a:r>
-              <a:rPr lang="fr-FR" sz="2700" b="1" baseline="0" dirty="0" smtClean="0"/>
-              <a:t>choix des librairies</a:t>
+              <a:t> technique : choix des librairies</a:t>
             </a:r>
             <a:endParaRPr lang="fr-FR" sz="2700" b="1" dirty="0"/>
           </a:p>
@@ -13476,7 +13461,7 @@
           <a:blip r:embed="rId2" cstate="print">
             <a:extLst>
               <a:ext uri="{28A0092B-C50C-407E-A947-70E740481C1C}">
-                <a14:useLocalDpi xmlns="" xmlns:a14="http://schemas.microsoft.com/office/drawing/2010/main" val="0"/>
+                <a14:useLocalDpi xmlns:a14="http://schemas.microsoft.com/office/drawing/2010/main" xmlns="" val="0"/>
               </a:ext>
             </a:extLst>
           </a:blip>
@@ -13497,7 +13482,7 @@
     </p:spTree>
     <p:extLst>
       <p:ext uri="{BB962C8B-B14F-4D97-AF65-F5344CB8AC3E}">
-        <p14:creationId xmlns="" xmlns:p14="http://schemas.microsoft.com/office/powerpoint/2010/main" val="2031947904"/>
+        <p14:creationId xmlns:p14="http://schemas.microsoft.com/office/powerpoint/2010/main" xmlns="" val="2031947904"/>
       </p:ext>
     </p:extLst>
   </p:cSld>
@@ -13686,7 +13671,7 @@
     </p:spTree>
     <p:extLst>
       <p:ext uri="{BB962C8B-B14F-4D97-AF65-F5344CB8AC3E}">
-        <p14:creationId xmlns="" xmlns:p14="http://schemas.microsoft.com/office/powerpoint/2010/main" val="1069172938"/>
+        <p14:creationId xmlns:p14="http://schemas.microsoft.com/office/powerpoint/2010/main" xmlns="" val="1069172938"/>
       </p:ext>
     </p:extLst>
   </p:cSld>
@@ -13854,7 +13839,7 @@
     </p:spTree>
     <p:extLst>
       <p:ext uri="{BB962C8B-B14F-4D97-AF65-F5344CB8AC3E}">
-        <p14:creationId xmlns="" xmlns:p14="http://schemas.microsoft.com/office/powerpoint/2010/main" val="1736557829"/>
+        <p14:creationId xmlns:p14="http://schemas.microsoft.com/office/powerpoint/2010/main" xmlns="" val="1736557829"/>
       </p:ext>
     </p:extLst>
   </p:cSld>
@@ -14095,7 +14080,7 @@
     </p:spTree>
     <p:extLst>
       <p:ext uri="{BB962C8B-B14F-4D97-AF65-F5344CB8AC3E}">
-        <p14:creationId xmlns="" xmlns:p14="http://schemas.microsoft.com/office/powerpoint/2010/main" val="3008812704"/>
+        <p14:creationId xmlns:p14="http://schemas.microsoft.com/office/powerpoint/2010/main" xmlns="" val="3008812704"/>
       </p:ext>
     </p:extLst>
   </p:cSld>
@@ -14217,7 +14202,7 @@
           <a:blip r:embed="rId2" cstate="print">
             <a:extLst>
               <a:ext uri="{28A0092B-C50C-407E-A947-70E740481C1C}">
-                <a14:useLocalDpi xmlns="" xmlns:a14="http://schemas.microsoft.com/office/drawing/2010/main" val="0"/>
+                <a14:useLocalDpi xmlns:a14="http://schemas.microsoft.com/office/drawing/2010/main" xmlns="" val="0"/>
               </a:ext>
             </a:extLst>
           </a:blip>
@@ -14238,7 +14223,7 @@
     </p:spTree>
     <p:extLst>
       <p:ext uri="{BB962C8B-B14F-4D97-AF65-F5344CB8AC3E}">
-        <p14:creationId xmlns="" xmlns:p14="http://schemas.microsoft.com/office/powerpoint/2010/main" val="2994034612"/>
+        <p14:creationId xmlns:p14="http://schemas.microsoft.com/office/powerpoint/2010/main" xmlns="" val="2994034612"/>
       </p:ext>
     </p:extLst>
   </p:cSld>
@@ -14467,7 +14452,7 @@
     </p:spTree>
     <p:extLst>
       <p:ext uri="{BB962C8B-B14F-4D97-AF65-F5344CB8AC3E}">
-        <p14:creationId xmlns="" xmlns:p14="http://schemas.microsoft.com/office/powerpoint/2010/main" val="4104827100"/>
+        <p14:creationId xmlns:p14="http://schemas.microsoft.com/office/powerpoint/2010/main" xmlns="" val="4104827100"/>
       </p:ext>
     </p:extLst>
   </p:cSld>
@@ -14831,7 +14816,7 @@
     </p:spTree>
     <p:extLst>
       <p:ext uri="{BB962C8B-B14F-4D97-AF65-F5344CB8AC3E}">
-        <p14:creationId xmlns="" xmlns:p14="http://schemas.microsoft.com/office/powerpoint/2010/main" val="2107107350"/>
+        <p14:creationId xmlns:p14="http://schemas.microsoft.com/office/powerpoint/2010/main" xmlns="" val="2107107350"/>
       </p:ext>
     </p:extLst>
   </p:cSld>
@@ -14946,7 +14931,7 @@
     </p:spTree>
     <p:extLst>
       <p:ext uri="{BB962C8B-B14F-4D97-AF65-F5344CB8AC3E}">
-        <p14:creationId xmlns="" xmlns:p14="http://schemas.microsoft.com/office/powerpoint/2010/main" val="62519305"/>
+        <p14:creationId xmlns:p14="http://schemas.microsoft.com/office/powerpoint/2010/main" xmlns="" val="62519305"/>
       </p:ext>
     </p:extLst>
   </p:cSld>
@@ -15038,7 +15023,7 @@
     </p:spTree>
     <p:extLst>
       <p:ext uri="{BB962C8B-B14F-4D97-AF65-F5344CB8AC3E}">
-        <p14:creationId xmlns="" xmlns:p14="http://schemas.microsoft.com/office/powerpoint/2010/main" val="4134145983"/>
+        <p14:creationId xmlns:p14="http://schemas.microsoft.com/office/powerpoint/2010/main" xmlns="" val="4134145983"/>
       </p:ext>
     </p:extLst>
   </p:cSld>
@@ -15313,7 +15298,7 @@
     </p:spTree>
     <p:extLst>
       <p:ext uri="{BB962C8B-B14F-4D97-AF65-F5344CB8AC3E}">
-        <p14:creationId xmlns="" xmlns:p14="http://schemas.microsoft.com/office/powerpoint/2010/main" val="3763621638"/>
+        <p14:creationId xmlns:p14="http://schemas.microsoft.com/office/powerpoint/2010/main" xmlns="" val="3763621638"/>
       </p:ext>
     </p:extLst>
   </p:cSld>
@@ -15567,7 +15552,7 @@
     </p:spTree>
     <p:extLst>
       <p:ext uri="{BB962C8B-B14F-4D97-AF65-F5344CB8AC3E}">
-        <p14:creationId xmlns="" xmlns:p14="http://schemas.microsoft.com/office/powerpoint/2010/main" val="3181566358"/>
+        <p14:creationId xmlns:p14="http://schemas.microsoft.com/office/powerpoint/2010/main" xmlns="" val="3181566358"/>
       </p:ext>
     </p:extLst>
   </p:cSld>
@@ -15734,7 +15719,7 @@
     </p:spTree>
     <p:extLst>
       <p:ext uri="{BB962C8B-B14F-4D97-AF65-F5344CB8AC3E}">
-        <p14:creationId xmlns="" xmlns:p14="http://schemas.microsoft.com/office/powerpoint/2010/main" val="3756851751"/>
+        <p14:creationId xmlns:p14="http://schemas.microsoft.com/office/powerpoint/2010/main" xmlns="" val="3756851751"/>
       </p:ext>
     </p:extLst>
   </p:cSld>
@@ -15911,7 +15896,7 @@
     </p:spTree>
     <p:extLst>
       <p:ext uri="{BB962C8B-B14F-4D97-AF65-F5344CB8AC3E}">
-        <p14:creationId xmlns="" xmlns:p14="http://schemas.microsoft.com/office/powerpoint/2010/main" val="3122075008"/>
+        <p14:creationId xmlns:p14="http://schemas.microsoft.com/office/powerpoint/2010/main" xmlns="" val="3122075008"/>
       </p:ext>
     </p:extLst>
   </p:cSld>
@@ -16100,7 +16085,7 @@
     </p:spTree>
     <p:extLst>
       <p:ext uri="{BB962C8B-B14F-4D97-AF65-F5344CB8AC3E}">
-        <p14:creationId xmlns="" xmlns:p14="http://schemas.microsoft.com/office/powerpoint/2010/main" val="722435913"/>
+        <p14:creationId xmlns:p14="http://schemas.microsoft.com/office/powerpoint/2010/main" xmlns="" val="722435913"/>
       </p:ext>
     </p:extLst>
   </p:cSld>
@@ -16268,7 +16253,7 @@
     </p:spTree>
     <p:extLst>
       <p:ext uri="{BB962C8B-B14F-4D97-AF65-F5344CB8AC3E}">
-        <p14:creationId xmlns="" xmlns:p14="http://schemas.microsoft.com/office/powerpoint/2010/main" val="4009963761"/>
+        <p14:creationId xmlns:p14="http://schemas.microsoft.com/office/powerpoint/2010/main" xmlns="" val="4009963761"/>
       </p:ext>
     </p:extLst>
   </p:cSld>
@@ -16495,7 +16480,7 @@
             <a:fld id="{5E09256A-1089-4A56-BE8A-73B40807B663}" type="datetimeFigureOut">
               <a:rPr lang="fr-FR" smtClean="0"/>
               <a:pPr/>
-              <a:t>23/03/2015</a:t>
+              <a:t>24/03/2015</a:t>
             </a:fld>
             <a:endParaRPr lang="fr-FR"/>
           </a:p>
@@ -16547,7 +16532,7 @@
     </p:spTree>
     <p:extLst>
       <p:ext uri="{BB962C8B-B14F-4D97-AF65-F5344CB8AC3E}">
-        <p14:creationId xmlns="" xmlns:p14="http://schemas.microsoft.com/office/powerpoint/2010/main" val="3960046616"/>
+        <p14:creationId xmlns:p14="http://schemas.microsoft.com/office/powerpoint/2010/main" xmlns="" val="3960046616"/>
       </p:ext>
     </p:extLst>
   </p:cSld>
@@ -16788,7 +16773,7 @@
     </p:spTree>
     <p:extLst>
       <p:ext uri="{BB962C8B-B14F-4D97-AF65-F5344CB8AC3E}">
-        <p14:creationId xmlns="" xmlns:p14="http://schemas.microsoft.com/office/powerpoint/2010/main" val="2253139673"/>
+        <p14:creationId xmlns:p14="http://schemas.microsoft.com/office/powerpoint/2010/main" xmlns="" val="2253139673"/>
       </p:ext>
     </p:extLst>
   </p:cSld>
@@ -17018,7 +17003,7 @@
     </p:spTree>
     <p:extLst>
       <p:ext uri="{BB962C8B-B14F-4D97-AF65-F5344CB8AC3E}">
-        <p14:creationId xmlns="" xmlns:p14="http://schemas.microsoft.com/office/powerpoint/2010/main" val="4107145658"/>
+        <p14:creationId xmlns:p14="http://schemas.microsoft.com/office/powerpoint/2010/main" xmlns="" val="4107145658"/>
       </p:ext>
     </p:extLst>
   </p:cSld>
@@ -17382,7 +17367,7 @@
     </p:spTree>
     <p:extLst>
       <p:ext uri="{BB962C8B-B14F-4D97-AF65-F5344CB8AC3E}">
-        <p14:creationId xmlns="" xmlns:p14="http://schemas.microsoft.com/office/powerpoint/2010/main" val="2772085650"/>
+        <p14:creationId xmlns:p14="http://schemas.microsoft.com/office/powerpoint/2010/main" xmlns="" val="2772085650"/>
       </p:ext>
     </p:extLst>
   </p:cSld>
@@ -17497,7 +17482,7 @@
     </p:spTree>
     <p:extLst>
       <p:ext uri="{BB962C8B-B14F-4D97-AF65-F5344CB8AC3E}">
-        <p14:creationId xmlns="" xmlns:p14="http://schemas.microsoft.com/office/powerpoint/2010/main" val="1034046890"/>
+        <p14:creationId xmlns:p14="http://schemas.microsoft.com/office/powerpoint/2010/main" xmlns="" val="1034046890"/>
       </p:ext>
     </p:extLst>
   </p:cSld>
@@ -17589,7 +17574,7 @@
     </p:spTree>
     <p:extLst>
       <p:ext uri="{BB962C8B-B14F-4D97-AF65-F5344CB8AC3E}">
-        <p14:creationId xmlns="" xmlns:p14="http://schemas.microsoft.com/office/powerpoint/2010/main" val="2784395407"/>
+        <p14:creationId xmlns:p14="http://schemas.microsoft.com/office/powerpoint/2010/main" xmlns="" val="2784395407"/>
       </p:ext>
     </p:extLst>
   </p:cSld>
@@ -17864,7 +17849,7 @@
     </p:spTree>
     <p:extLst>
       <p:ext uri="{BB962C8B-B14F-4D97-AF65-F5344CB8AC3E}">
-        <p14:creationId xmlns="" xmlns:p14="http://schemas.microsoft.com/office/powerpoint/2010/main" val="2575972213"/>
+        <p14:creationId xmlns:p14="http://schemas.microsoft.com/office/powerpoint/2010/main" xmlns="" val="2575972213"/>
       </p:ext>
     </p:extLst>
   </p:cSld>
@@ -18118,7 +18103,7 @@
     </p:spTree>
     <p:extLst>
       <p:ext uri="{BB962C8B-B14F-4D97-AF65-F5344CB8AC3E}">
-        <p14:creationId xmlns="" xmlns:p14="http://schemas.microsoft.com/office/powerpoint/2010/main" val="3042924280"/>
+        <p14:creationId xmlns:p14="http://schemas.microsoft.com/office/powerpoint/2010/main" xmlns="" val="3042924280"/>
       </p:ext>
     </p:extLst>
   </p:cSld>
@@ -18285,7 +18270,7 @@
     </p:spTree>
     <p:extLst>
       <p:ext uri="{BB962C8B-B14F-4D97-AF65-F5344CB8AC3E}">
-        <p14:creationId xmlns="" xmlns:p14="http://schemas.microsoft.com/office/powerpoint/2010/main" val="1214538743"/>
+        <p14:creationId xmlns:p14="http://schemas.microsoft.com/office/powerpoint/2010/main" xmlns="" val="1214538743"/>
       </p:ext>
     </p:extLst>
   </p:cSld>
@@ -18462,7 +18447,7 @@
     </p:spTree>
     <p:extLst>
       <p:ext uri="{BB962C8B-B14F-4D97-AF65-F5344CB8AC3E}">
-        <p14:creationId xmlns="" xmlns:p14="http://schemas.microsoft.com/office/powerpoint/2010/main" val="723466846"/>
+        <p14:creationId xmlns:p14="http://schemas.microsoft.com/office/powerpoint/2010/main" xmlns="" val="723466846"/>
       </p:ext>
     </p:extLst>
   </p:cSld>
@@ -20267,7 +20252,7 @@
             <a:fld id="{5E09256A-1089-4A56-BE8A-73B40807B663}" type="datetimeFigureOut">
               <a:rPr lang="fr-FR" smtClean="0"/>
               <a:pPr/>
-              <a:t>23/03/2015</a:t>
+              <a:t>24/03/2015</a:t>
             </a:fld>
             <a:endParaRPr lang="fr-FR"/>
           </a:p>
@@ -20319,7 +20304,7 @@
     </p:spTree>
     <p:extLst>
       <p:ext uri="{BB962C8B-B14F-4D97-AF65-F5344CB8AC3E}">
-        <p14:creationId xmlns="" xmlns:p14="http://schemas.microsoft.com/office/powerpoint/2010/main" val="2231591658"/>
+        <p14:creationId xmlns:p14="http://schemas.microsoft.com/office/powerpoint/2010/main" xmlns="" val="2231591658"/>
       </p:ext>
     </p:extLst>
   </p:cSld>
@@ -20482,7 +20467,7 @@
           <a:blip r:embed="rId2" cstate="print">
             <a:extLst>
               <a:ext uri="{28A0092B-C50C-407E-A947-70E740481C1C}">
-                <a14:useLocalDpi xmlns="" xmlns:a14="http://schemas.microsoft.com/office/drawing/2010/main" val="0"/>
+                <a14:useLocalDpi xmlns:a14="http://schemas.microsoft.com/office/drawing/2010/main" xmlns="" val="0"/>
               </a:ext>
             </a:extLst>
           </a:blip>
@@ -20503,7 +20488,7 @@
     </p:spTree>
     <p:extLst>
       <p:ext uri="{BB962C8B-B14F-4D97-AF65-F5344CB8AC3E}">
-        <p14:creationId xmlns="" xmlns:p14="http://schemas.microsoft.com/office/powerpoint/2010/main" val="728997652"/>
+        <p14:creationId xmlns:p14="http://schemas.microsoft.com/office/powerpoint/2010/main" xmlns="" val="728997652"/>
       </p:ext>
     </p:extLst>
   </p:cSld>
@@ -20629,7 +20614,7 @@
                 </a:solidFill>
               </a:rPr>
               <a:pPr/>
-              <a:t>23/03/2015</a:t>
+              <a:t>24/03/2015</a:t>
             </a:fld>
             <a:endParaRPr lang="fr-FR">
               <a:solidFill>
@@ -20705,7 +20690,7 @@
     </p:spTree>
     <p:extLst>
       <p:ext uri="{BB962C8B-B14F-4D97-AF65-F5344CB8AC3E}">
-        <p14:creationId xmlns="" xmlns:p14="http://schemas.microsoft.com/office/powerpoint/2010/main" val="607141693"/>
+        <p14:creationId xmlns:p14="http://schemas.microsoft.com/office/powerpoint/2010/main" xmlns="" val="607141693"/>
       </p:ext>
     </p:extLst>
   </p:cSld>
@@ -20907,7 +20892,7 @@
                 </a:solidFill>
               </a:rPr>
               <a:pPr/>
-              <a:t>23/03/2015</a:t>
+              <a:t>24/03/2015</a:t>
             </a:fld>
             <a:endParaRPr lang="fr-FR">
               <a:solidFill>
@@ -20983,7 +20968,7 @@
     </p:spTree>
     <p:extLst>
       <p:ext uri="{BB962C8B-B14F-4D97-AF65-F5344CB8AC3E}">
-        <p14:creationId xmlns="" xmlns:p14="http://schemas.microsoft.com/office/powerpoint/2010/main" val="760728903"/>
+        <p14:creationId xmlns:p14="http://schemas.microsoft.com/office/powerpoint/2010/main" xmlns="" val="760728903"/>
       </p:ext>
     </p:extLst>
   </p:cSld>
@@ -21171,7 +21156,7 @@
                 </a:solidFill>
               </a:rPr>
               <a:pPr/>
-              <a:t>23/03/2015</a:t>
+              <a:t>24/03/2015</a:t>
             </a:fld>
             <a:endParaRPr lang="fr-FR">
               <a:solidFill>
@@ -21247,7 +21232,7 @@
     </p:spTree>
     <p:extLst>
       <p:ext uri="{BB962C8B-B14F-4D97-AF65-F5344CB8AC3E}">
-        <p14:creationId xmlns="" xmlns:p14="http://schemas.microsoft.com/office/powerpoint/2010/main" val="1640630314"/>
+        <p14:creationId xmlns:p14="http://schemas.microsoft.com/office/powerpoint/2010/main" xmlns="" val="1640630314"/>
       </p:ext>
     </p:extLst>
   </p:cSld>
@@ -21570,7 +21555,7 @@
                 </a:solidFill>
               </a:rPr>
               <a:pPr/>
-              <a:t>23/03/2015</a:t>
+              <a:t>24/03/2015</a:t>
             </a:fld>
             <a:endParaRPr lang="fr-FR">
               <a:solidFill>
@@ -21646,7 +21631,7 @@
     </p:spTree>
     <p:extLst>
       <p:ext uri="{BB962C8B-B14F-4D97-AF65-F5344CB8AC3E}">
-        <p14:creationId xmlns="" xmlns:p14="http://schemas.microsoft.com/office/powerpoint/2010/main" val="1555657180"/>
+        <p14:creationId xmlns:p14="http://schemas.microsoft.com/office/powerpoint/2010/main" xmlns="" val="1555657180"/>
       </p:ext>
     </p:extLst>
   </p:cSld>
@@ -21720,7 +21705,7 @@
                 </a:solidFill>
               </a:rPr>
               <a:pPr/>
-              <a:t>23/03/2015</a:t>
+              <a:t>24/03/2015</a:t>
             </a:fld>
             <a:endParaRPr lang="fr-FR">
               <a:solidFill>
@@ -21796,7 +21781,7 @@
     </p:spTree>
     <p:extLst>
       <p:ext uri="{BB962C8B-B14F-4D97-AF65-F5344CB8AC3E}">
-        <p14:creationId xmlns="" xmlns:p14="http://schemas.microsoft.com/office/powerpoint/2010/main" val="3324675135"/>
+        <p14:creationId xmlns:p14="http://schemas.microsoft.com/office/powerpoint/2010/main" xmlns="" val="3324675135"/>
       </p:ext>
     </p:extLst>
   </p:cSld>
@@ -21934,7 +21919,7 @@
           <a:blip r:embed="rId2" cstate="print">
             <a:extLst>
               <a:ext uri="{28A0092B-C50C-407E-A947-70E740481C1C}">
-                <a14:useLocalDpi xmlns="" xmlns:a14="http://schemas.microsoft.com/office/drawing/2010/main" val="0"/>
+                <a14:useLocalDpi xmlns:a14="http://schemas.microsoft.com/office/drawing/2010/main" xmlns="" val="0"/>
               </a:ext>
             </a:extLst>
           </a:blip>
@@ -21955,7 +21940,7 @@
     </p:spTree>
     <p:extLst>
       <p:ext uri="{BB962C8B-B14F-4D97-AF65-F5344CB8AC3E}">
-        <p14:creationId xmlns="" xmlns:p14="http://schemas.microsoft.com/office/powerpoint/2010/main" val="3392233902"/>
+        <p14:creationId xmlns:p14="http://schemas.microsoft.com/office/powerpoint/2010/main" xmlns="" val="3392233902"/>
       </p:ext>
     </p:extLst>
   </p:cSld>
@@ -22188,7 +22173,7 @@
                 </a:solidFill>
               </a:rPr>
               <a:pPr/>
-              <a:t>23/03/2015</a:t>
+              <a:t>24/03/2015</a:t>
             </a:fld>
             <a:endParaRPr lang="fr-FR">
               <a:solidFill>
@@ -22264,7 +22249,7 @@
     </p:spTree>
     <p:extLst>
       <p:ext uri="{BB962C8B-B14F-4D97-AF65-F5344CB8AC3E}">
-        <p14:creationId xmlns="" xmlns:p14="http://schemas.microsoft.com/office/powerpoint/2010/main" val="3538579442"/>
+        <p14:creationId xmlns:p14="http://schemas.microsoft.com/office/powerpoint/2010/main" xmlns="" val="3538579442"/>
       </p:ext>
     </p:extLst>
   </p:cSld>
@@ -22473,7 +22458,7 @@
                 </a:solidFill>
               </a:rPr>
               <a:pPr/>
-              <a:t>23/03/2015</a:t>
+              <a:t>24/03/2015</a:t>
             </a:fld>
             <a:endParaRPr lang="fr-FR">
               <a:solidFill>
@@ -22549,7 +22534,7 @@
     </p:spTree>
     <p:extLst>
       <p:ext uri="{BB962C8B-B14F-4D97-AF65-F5344CB8AC3E}">
-        <p14:creationId xmlns="" xmlns:p14="http://schemas.microsoft.com/office/powerpoint/2010/main" val="1131650965"/>
+        <p14:creationId xmlns:p14="http://schemas.microsoft.com/office/powerpoint/2010/main" xmlns="" val="1131650965"/>
       </p:ext>
     </p:extLst>
   </p:cSld>
@@ -22675,7 +22660,7 @@
                 </a:solidFill>
               </a:rPr>
               <a:pPr/>
-              <a:t>23/03/2015</a:t>
+              <a:t>24/03/2015</a:t>
             </a:fld>
             <a:endParaRPr lang="fr-FR">
               <a:solidFill>
@@ -22751,7 +22736,7 @@
     </p:spTree>
     <p:extLst>
       <p:ext uri="{BB962C8B-B14F-4D97-AF65-F5344CB8AC3E}">
-        <p14:creationId xmlns="" xmlns:p14="http://schemas.microsoft.com/office/powerpoint/2010/main" val="2909831079"/>
+        <p14:creationId xmlns:p14="http://schemas.microsoft.com/office/powerpoint/2010/main" xmlns="" val="2909831079"/>
       </p:ext>
     </p:extLst>
   </p:cSld>
@@ -22914,7 +22899,7 @@
             <a:fld id="{5E09256A-1089-4A56-BE8A-73B40807B663}" type="datetimeFigureOut">
               <a:rPr lang="fr-FR" smtClean="0"/>
               <a:pPr/>
-              <a:t>23/03/2015</a:t>
+              <a:t>24/03/2015</a:t>
             </a:fld>
             <a:endParaRPr lang="fr-FR"/>
           </a:p>
@@ -23002,7 +22987,7 @@
     </p:spTree>
     <p:extLst>
       <p:ext uri="{BB962C8B-B14F-4D97-AF65-F5344CB8AC3E}">
-        <p14:creationId xmlns="" xmlns:p14="http://schemas.microsoft.com/office/powerpoint/2010/main" val="2975763296"/>
+        <p14:creationId xmlns:p14="http://schemas.microsoft.com/office/powerpoint/2010/main" xmlns="" val="2975763296"/>
       </p:ext>
     </p:extLst>
   </p:cSld>
@@ -23539,7 +23524,7 @@
     </p:spTree>
     <p:extLst>
       <p:ext uri="{BB962C8B-B14F-4D97-AF65-F5344CB8AC3E}">
-        <p14:creationId xmlns="" xmlns:p14="http://schemas.microsoft.com/office/powerpoint/2010/main" val="1451620213"/>
+        <p14:creationId xmlns:p14="http://schemas.microsoft.com/office/powerpoint/2010/main" xmlns="" val="1451620213"/>
       </p:ext>
     </p:extLst>
   </p:cSld>
@@ -24077,7 +24062,7 @@
     </p:spTree>
     <p:extLst>
       <p:ext uri="{BB962C8B-B14F-4D97-AF65-F5344CB8AC3E}">
-        <p14:creationId xmlns="" xmlns:p14="http://schemas.microsoft.com/office/powerpoint/2010/main" val="2856405653"/>
+        <p14:creationId xmlns:p14="http://schemas.microsoft.com/office/powerpoint/2010/main" xmlns="" val="2856405653"/>
       </p:ext>
     </p:extLst>
   </p:cSld>
@@ -24532,7 +24517,7 @@
             <a:fld id="{C764DE79-268F-4C1A-8933-263129D2AF90}" type="datetimeFigureOut">
               <a:rPr lang="en-US" dirty="0"/>
               <a:pPr/>
-              <a:t>3/23/2015</a:t>
+              <a:t>3/24/2015</a:t>
             </a:fld>
             <a:endParaRPr lang="en-US" dirty="0"/>
           </a:p>
@@ -24688,7 +24673,7 @@
           <a:blip r:embed="rId23" cstate="print">
             <a:extLst>
               <a:ext uri="{28A0092B-C50C-407E-A947-70E740481C1C}">
-                <a14:useLocalDpi xmlns="" xmlns:a14="http://schemas.microsoft.com/office/drawing/2010/main" val="0"/>
+                <a14:useLocalDpi xmlns:a14="http://schemas.microsoft.com/office/drawing/2010/main" xmlns="" val="0"/>
               </a:ext>
             </a:extLst>
           </a:blip>
@@ -24709,7 +24694,7 @@
     </p:spTree>
     <p:extLst>
       <p:ext uri="{BB962C8B-B14F-4D97-AF65-F5344CB8AC3E}">
-        <p14:creationId xmlns="" xmlns:p14="http://schemas.microsoft.com/office/powerpoint/2010/main" val="4266296144"/>
+        <p14:creationId xmlns:p14="http://schemas.microsoft.com/office/powerpoint/2010/main" xmlns="" val="4266296144"/>
       </p:ext>
     </p:extLst>
   </p:cSld>
@@ -25174,7 +25159,7 @@
             <a:fld id="{5E09256A-1089-4A56-BE8A-73B40807B663}" type="datetimeFigureOut">
               <a:rPr lang="fr-FR" smtClean="0"/>
               <a:pPr/>
-              <a:t>23/03/2015</a:t>
+              <a:t>24/03/2015</a:t>
             </a:fld>
             <a:endParaRPr lang="fr-FR"/>
           </a:p>
@@ -25262,7 +25247,7 @@
     </p:spTree>
     <p:extLst>
       <p:ext uri="{BB962C8B-B14F-4D97-AF65-F5344CB8AC3E}">
-        <p14:creationId xmlns="" xmlns:p14="http://schemas.microsoft.com/office/powerpoint/2010/main" val="3972257505"/>
+        <p14:creationId xmlns:p14="http://schemas.microsoft.com/office/powerpoint/2010/main" xmlns="" val="3972257505"/>
       </p:ext>
     </p:extLst>
   </p:cSld>
@@ -25717,7 +25702,7 @@
             <a:fld id="{5E09256A-1089-4A56-BE8A-73B40807B663}" type="datetimeFigureOut">
               <a:rPr lang="fr-FR" smtClean="0"/>
               <a:pPr/>
-              <a:t>23/03/2015</a:t>
+              <a:t>24/03/2015</a:t>
             </a:fld>
             <a:endParaRPr lang="fr-FR"/>
           </a:p>
@@ -25805,7 +25790,7 @@
     </p:spTree>
     <p:extLst>
       <p:ext uri="{BB962C8B-B14F-4D97-AF65-F5344CB8AC3E}">
-        <p14:creationId xmlns="" xmlns:p14="http://schemas.microsoft.com/office/powerpoint/2010/main" val="1634485421"/>
+        <p14:creationId xmlns:p14="http://schemas.microsoft.com/office/powerpoint/2010/main" xmlns="" val="1634485421"/>
       </p:ext>
     </p:extLst>
   </p:cSld>
@@ -26259,7 +26244,7 @@
             <a:fld id="{5E09256A-1089-4A56-BE8A-73B40807B663}" type="datetimeFigureOut">
               <a:rPr lang="fr-FR" smtClean="0"/>
               <a:pPr/>
-              <a:t>23/03/2015</a:t>
+              <a:t>24/03/2015</a:t>
             </a:fld>
             <a:endParaRPr lang="fr-FR"/>
           </a:p>
@@ -26347,7 +26332,7 @@
     </p:spTree>
     <p:extLst>
       <p:ext uri="{BB962C8B-B14F-4D97-AF65-F5344CB8AC3E}">
-        <p14:creationId xmlns="" xmlns:p14="http://schemas.microsoft.com/office/powerpoint/2010/main" val="1236237055"/>
+        <p14:creationId xmlns:p14="http://schemas.microsoft.com/office/powerpoint/2010/main" xmlns="" val="1236237055"/>
       </p:ext>
     </p:extLst>
   </p:cSld>
@@ -26808,7 +26793,7 @@
                 </a:solidFill>
               </a:rPr>
               <a:pPr/>
-              <a:t>23/03/2015</a:t>
+              <a:t>24/03/2015</a:t>
             </a:fld>
             <a:endParaRPr lang="fr-FR">
               <a:solidFill>
@@ -26920,7 +26905,7 @@
     </p:spTree>
     <p:extLst>
       <p:ext uri="{BB962C8B-B14F-4D97-AF65-F5344CB8AC3E}">
-        <p14:creationId xmlns="" xmlns:p14="http://schemas.microsoft.com/office/powerpoint/2010/main" val="336681704"/>
+        <p14:creationId xmlns:p14="http://schemas.microsoft.com/office/powerpoint/2010/main" xmlns="" val="336681704"/>
       </p:ext>
     </p:extLst>
   </p:cSld>
@@ -28058,7 +28043,7 @@
     </p:spTree>
     <p:extLst>
       <p:ext uri="{BB962C8B-B14F-4D97-AF65-F5344CB8AC3E}">
-        <p14:creationId xmlns="" xmlns:p14="http://schemas.microsoft.com/office/powerpoint/2010/main" val="2712463469"/>
+        <p14:creationId xmlns:p14="http://schemas.microsoft.com/office/powerpoint/2010/main" xmlns="" val="2712463469"/>
       </p:ext>
     </p:extLst>
   </p:cSld>
@@ -28092,52 +28077,35 @@
           <a:chExt cx="0" cy="0"/>
         </a:xfrm>
       </p:grpSpPr>
-      <p:pic>
-        <p:nvPicPr>
-          <p:cNvPr id="2" name="Image 1"/>
-          <p:cNvPicPr>
-            <a:picLocks noChangeAspect="1"/>
-          </p:cNvPicPr>
-          <p:nvPr/>
-        </p:nvPicPr>
-        <p:blipFill rotWithShape="1">
-          <a:blip r:embed="rId2">
-            <a:extLst>
-              <a:ext uri="{28A0092B-C50C-407E-A947-70E740481C1C}">
-                <a14:useLocalDpi xmlns="" xmlns:a14="http://schemas.microsoft.com/office/drawing/2010/main" val="0"/>
-              </a:ext>
-            </a:extLst>
-          </a:blip>
-          <a:srcRect l="11329"/>
-          <a:stretch/>
-        </p:blipFill>
-        <p:spPr>
-          <a:xfrm>
-            <a:off x="1" y="1982111"/>
-            <a:ext cx="9144000" cy="2835000"/>
-          </a:xfrm>
-          <a:prstGeom prst="rect">
-            <a:avLst/>
-          </a:prstGeom>
-        </p:spPr>
-      </p:pic>
+      <p:sp>
+        <p:nvSpPr>
+          <p:cNvPr id="2" name="Espace réservé du numéro de diapositive 1"/>
+          <p:cNvSpPr>
+            <a:spLocks noGrp="1"/>
+          </p:cNvSpPr>
+          <p:nvPr>
+            <p:ph type="sldNum" sz="quarter" idx="12"/>
+          </p:nvPr>
+        </p:nvSpPr>
+        <p:spPr/>
+        <p:txBody>
+          <a:bodyPr/>
+          <a:lstStyle/>
+          <a:p>
+            <a:fld id="{B1B82BA0-60F9-44CB-BFC2-FE4D3FC091B4}" type="slidenum">
+              <a:rPr lang="fr-FR" smtClean="0"/>
+              <a:pPr/>
+              <a:t>11</a:t>
+            </a:fld>
+            <a:endParaRPr lang="fr-FR"/>
+          </a:p>
+        </p:txBody>
+      </p:sp>
     </p:spTree>
-    <p:extLst>
-      <p:ext uri="{BB962C8B-B14F-4D97-AF65-F5344CB8AC3E}">
-        <p14:creationId xmlns="" xmlns:p14="http://schemas.microsoft.com/office/powerpoint/2010/main" val="4073964400"/>
-      </p:ext>
-    </p:extLst>
   </p:cSld>
   <p:clrMapOvr>
     <a:masterClrMapping/>
   </p:clrMapOvr>
-  <p:timing>
-    <p:tnLst>
-      <p:par>
-        <p:cTn id="1" dur="indefinite" restart="never" nodeType="tmRoot"/>
-      </p:par>
-    </p:tnLst>
-  </p:timing>
 </p:sld>
 </file>
 
@@ -28158,151 +28126,39 @@
           <a:chExt cx="0" cy="0"/>
         </a:xfrm>
       </p:grpSpPr>
-      <p:sp>
-        <p:nvSpPr>
-          <p:cNvPr id="5" name="ZoneTexte 4"/>
-          <p:cNvSpPr txBox="1"/>
+      <p:pic>
+        <p:nvPicPr>
+          <p:cNvPr id="2" name="Image 1"/>
+          <p:cNvPicPr>
+            <a:picLocks noChangeAspect="1"/>
+          </p:cNvPicPr>
           <p:nvPr/>
-        </p:nvSpPr>
+        </p:nvPicPr>
+        <p:blipFill rotWithShape="1">
+          <a:blip r:embed="rId2">
+            <a:extLst>
+              <a:ext uri="{28A0092B-C50C-407E-A947-70E740481C1C}">
+                <a14:useLocalDpi xmlns:a14="http://schemas.microsoft.com/office/drawing/2010/main" xmlns="" val="0"/>
+              </a:ext>
+            </a:extLst>
+          </a:blip>
+          <a:srcRect l="11329"/>
+          <a:stretch/>
+        </p:blipFill>
         <p:spPr>
           <a:xfrm>
-            <a:off x="1153235" y="1557905"/>
-            <a:ext cx="6858000" cy="4893647"/>
+            <a:off x="1" y="1982111"/>
+            <a:ext cx="9144000" cy="2835000"/>
           </a:xfrm>
           <a:prstGeom prst="rect">
             <a:avLst/>
           </a:prstGeom>
-          <a:noFill/>
         </p:spPr>
-        <p:txBody>
-          <a:bodyPr wrap="square" numCol="1" rtlCol="0">
-            <a:spAutoFit/>
-          </a:bodyPr>
-          <a:lstStyle/>
-          <a:p>
-            <a:pPr marL="728663" lvl="1" indent="-385763" algn="just">
-              <a:lnSpc>
-                <a:spcPct val="150000"/>
-              </a:lnSpc>
-              <a:buFont typeface="+mj-lt"/>
-              <a:buAutoNum type="arabicPeriod"/>
-            </a:pPr>
-            <a:r>
-              <a:rPr lang="fr-FR" sz="2700" dirty="0">
-                <a:solidFill>
-                  <a:schemeClr val="bg1">
-                    <a:lumMod val="95000"/>
-                  </a:schemeClr>
-                </a:solidFill>
-              </a:rPr>
-              <a:t>Contexte et objectif</a:t>
-            </a:r>
-          </a:p>
-          <a:p>
-            <a:pPr marL="728663" lvl="1" indent="-385763" algn="just">
-              <a:lnSpc>
-                <a:spcPct val="150000"/>
-              </a:lnSpc>
-              <a:buFont typeface="+mj-lt"/>
-              <a:buAutoNum type="arabicPeriod"/>
-            </a:pPr>
-            <a:r>
-              <a:rPr lang="fr-FR" sz="2700" dirty="0">
-                <a:solidFill>
-                  <a:schemeClr val="bg2"/>
-                </a:solidFill>
-              </a:rPr>
-              <a:t>Analyses</a:t>
-            </a:r>
-          </a:p>
-          <a:p>
-            <a:pPr marL="685800" lvl="1" indent="-342900">
-              <a:buFont typeface="+mj-lt"/>
-              <a:buAutoNum type="arabicPeriod"/>
-            </a:pPr>
-            <a:r>
-              <a:rPr lang="fr-FR" sz="2700" dirty="0"/>
-              <a:t> Solution technique</a:t>
-            </a:r>
-          </a:p>
-          <a:p>
-            <a:pPr marL="1114425" lvl="2" indent="-428625">
-              <a:buFont typeface="Wingdings" panose="05000000000000000000" pitchFamily="2" charset="2"/>
-              <a:buChar char="§"/>
-            </a:pPr>
-            <a:r>
-              <a:rPr lang="fr-FR" sz="2400" dirty="0"/>
-              <a:t>Choix du langage</a:t>
-            </a:r>
-          </a:p>
-          <a:p>
-            <a:pPr marL="1114425" lvl="2" indent="-428625">
-              <a:buFont typeface="Wingdings" panose="05000000000000000000" pitchFamily="2" charset="2"/>
-              <a:buChar char="§"/>
-            </a:pPr>
-            <a:r>
-              <a:rPr lang="fr-FR" sz="2400" dirty="0"/>
-              <a:t>Choix de librairies</a:t>
-            </a:r>
-          </a:p>
-          <a:p>
-            <a:pPr marL="1114425" lvl="2" indent="-428625">
-              <a:buFont typeface="Wingdings" panose="05000000000000000000" pitchFamily="2" charset="2"/>
-              <a:buChar char="§"/>
-            </a:pPr>
-            <a:r>
-              <a:rPr lang="fr-FR" sz="2400" dirty="0"/>
-              <a:t>Définition des indicateurs de performances</a:t>
-            </a:r>
-          </a:p>
-          <a:p>
-            <a:pPr lvl="2"/>
-            <a:endParaRPr lang="fr-FR" sz="2400" dirty="0"/>
-          </a:p>
-          <a:p>
-            <a:pPr marL="685800" lvl="1" indent="-342900">
-              <a:buFont typeface="+mj-lt"/>
-              <a:buAutoNum type="arabicPeriod"/>
-            </a:pPr>
-            <a:r>
-              <a:rPr lang="fr-FR" sz="2700" dirty="0">
-                <a:solidFill>
-                  <a:schemeClr val="bg2"/>
-                </a:solidFill>
-              </a:rPr>
-              <a:t>Gestion de projet</a:t>
-            </a:r>
-          </a:p>
-          <a:p>
-            <a:pPr lvl="2"/>
-            <a:endParaRPr lang="fr-FR" sz="2700" dirty="0"/>
-          </a:p>
-          <a:p>
-            <a:pPr marL="685800" lvl="1" indent="-342900">
-              <a:buFont typeface="+mj-lt"/>
-              <a:buAutoNum type="arabicPeriod"/>
-            </a:pPr>
-            <a:endParaRPr lang="fr-FR" sz="2700" dirty="0"/>
-          </a:p>
-          <a:p>
-            <a:pPr marL="1114425" lvl="2" indent="-428625">
-              <a:buFont typeface="Wingdings" panose="05000000000000000000" pitchFamily="2" charset="2"/>
-              <a:buChar char="§"/>
-            </a:pPr>
-            <a:endParaRPr lang="fr-FR" sz="2700" dirty="0">
-              <a:solidFill>
-                <a:schemeClr val="bg1">
-                  <a:lumMod val="95000"/>
-                </a:schemeClr>
-              </a:solidFill>
-            </a:endParaRPr>
-          </a:p>
-        </p:txBody>
-      </p:sp>
+      </p:pic>
     </p:spTree>
     <p:extLst>
       <p:ext uri="{BB962C8B-B14F-4D97-AF65-F5344CB8AC3E}">
-        <p14:creationId xmlns="" xmlns:p14="http://schemas.microsoft.com/office/powerpoint/2010/main" val="3497500841"/>
+        <p14:creationId xmlns:p14="http://schemas.microsoft.com/office/powerpoint/2010/main" xmlns="" val="4073964400"/>
       </p:ext>
     </p:extLst>
   </p:cSld>
@@ -28320,6 +28176,184 @@
 </file>
 
 <file path=ppt/slides/slide13.xml><?xml version="1.0" encoding="utf-8"?>
+<p:sld xmlns:a="http://schemas.openxmlformats.org/drawingml/2006/main" xmlns:r="http://schemas.openxmlformats.org/officeDocument/2006/relationships" xmlns:p="http://schemas.openxmlformats.org/presentationml/2006/main">
+  <p:cSld>
+    <p:spTree>
+      <p:nvGrpSpPr>
+        <p:cNvPr id="1" name=""/>
+        <p:cNvGrpSpPr/>
+        <p:nvPr/>
+      </p:nvGrpSpPr>
+      <p:grpSpPr>
+        <a:xfrm>
+          <a:off x="0" y="0"/>
+          <a:ext cx="0" cy="0"/>
+          <a:chOff x="0" y="0"/>
+          <a:chExt cx="0" cy="0"/>
+        </a:xfrm>
+      </p:grpSpPr>
+      <p:sp>
+        <p:nvSpPr>
+          <p:cNvPr id="5" name="ZoneTexte 4"/>
+          <p:cNvSpPr txBox="1"/>
+          <p:nvPr/>
+        </p:nvSpPr>
+        <p:spPr>
+          <a:xfrm>
+            <a:off x="1153235" y="1557905"/>
+            <a:ext cx="6858000" cy="4893647"/>
+          </a:xfrm>
+          <a:prstGeom prst="rect">
+            <a:avLst/>
+          </a:prstGeom>
+          <a:noFill/>
+        </p:spPr>
+        <p:txBody>
+          <a:bodyPr wrap="square" numCol="1" rtlCol="0">
+            <a:spAutoFit/>
+          </a:bodyPr>
+          <a:lstStyle/>
+          <a:p>
+            <a:pPr marL="728663" lvl="1" indent="-385763" algn="just">
+              <a:lnSpc>
+                <a:spcPct val="150000"/>
+              </a:lnSpc>
+              <a:buFont typeface="+mj-lt"/>
+              <a:buAutoNum type="arabicPeriod"/>
+            </a:pPr>
+            <a:r>
+              <a:rPr lang="fr-FR" sz="2700" dirty="0">
+                <a:solidFill>
+                  <a:schemeClr val="bg1">
+                    <a:lumMod val="95000"/>
+                  </a:schemeClr>
+                </a:solidFill>
+              </a:rPr>
+              <a:t>Contexte et objectif</a:t>
+            </a:r>
+          </a:p>
+          <a:p>
+            <a:pPr marL="728663" lvl="1" indent="-385763" algn="just">
+              <a:lnSpc>
+                <a:spcPct val="150000"/>
+              </a:lnSpc>
+              <a:buFont typeface="+mj-lt"/>
+              <a:buAutoNum type="arabicPeriod"/>
+            </a:pPr>
+            <a:r>
+              <a:rPr lang="fr-FR" sz="2700" dirty="0">
+                <a:solidFill>
+                  <a:schemeClr val="bg2"/>
+                </a:solidFill>
+              </a:rPr>
+              <a:t>Analyses</a:t>
+            </a:r>
+          </a:p>
+          <a:p>
+            <a:pPr marL="685800" lvl="1" indent="-342900">
+              <a:buFont typeface="+mj-lt"/>
+              <a:buAutoNum type="arabicPeriod"/>
+            </a:pPr>
+            <a:r>
+              <a:rPr lang="fr-FR" sz="2700" dirty="0"/>
+              <a:t> Solution technique</a:t>
+            </a:r>
+          </a:p>
+          <a:p>
+            <a:pPr marL="1114425" lvl="2" indent="-428625">
+              <a:buFont typeface="Wingdings" panose="05000000000000000000" pitchFamily="2" charset="2"/>
+              <a:buChar char="§"/>
+            </a:pPr>
+            <a:r>
+              <a:rPr lang="fr-FR" sz="2400" dirty="0"/>
+              <a:t>Choix du langage</a:t>
+            </a:r>
+          </a:p>
+          <a:p>
+            <a:pPr marL="1114425" lvl="2" indent="-428625">
+              <a:buFont typeface="Wingdings" panose="05000000000000000000" pitchFamily="2" charset="2"/>
+              <a:buChar char="§"/>
+            </a:pPr>
+            <a:r>
+              <a:rPr lang="fr-FR" sz="2400" dirty="0"/>
+              <a:t>Choix de librairies</a:t>
+            </a:r>
+          </a:p>
+          <a:p>
+            <a:pPr marL="1114425" lvl="2" indent="-428625">
+              <a:buFont typeface="Wingdings" panose="05000000000000000000" pitchFamily="2" charset="2"/>
+              <a:buChar char="§"/>
+            </a:pPr>
+            <a:r>
+              <a:rPr lang="fr-FR" sz="2400" dirty="0"/>
+              <a:t>Définition des indicateurs de performances</a:t>
+            </a:r>
+          </a:p>
+          <a:p>
+            <a:pPr lvl="2"/>
+            <a:endParaRPr lang="fr-FR" sz="2400" dirty="0"/>
+          </a:p>
+          <a:p>
+            <a:pPr marL="685800" lvl="1" indent="-342900">
+              <a:buFont typeface="+mj-lt"/>
+              <a:buAutoNum type="arabicPeriod"/>
+            </a:pPr>
+            <a:r>
+              <a:rPr lang="fr-FR" sz="2700" dirty="0">
+                <a:solidFill>
+                  <a:schemeClr val="bg2"/>
+                </a:solidFill>
+              </a:rPr>
+              <a:t>Gestion de projet</a:t>
+            </a:r>
+          </a:p>
+          <a:p>
+            <a:pPr lvl="2"/>
+            <a:endParaRPr lang="fr-FR" sz="2700" dirty="0"/>
+          </a:p>
+          <a:p>
+            <a:pPr marL="685800" lvl="1" indent="-342900">
+              <a:buFont typeface="+mj-lt"/>
+              <a:buAutoNum type="arabicPeriod"/>
+            </a:pPr>
+            <a:endParaRPr lang="fr-FR" sz="2700" dirty="0"/>
+          </a:p>
+          <a:p>
+            <a:pPr marL="1114425" lvl="2" indent="-428625">
+              <a:buFont typeface="Wingdings" panose="05000000000000000000" pitchFamily="2" charset="2"/>
+              <a:buChar char="§"/>
+            </a:pPr>
+            <a:endParaRPr lang="fr-FR" sz="2700" dirty="0">
+              <a:solidFill>
+                <a:schemeClr val="bg1">
+                  <a:lumMod val="95000"/>
+                </a:schemeClr>
+              </a:solidFill>
+            </a:endParaRPr>
+          </a:p>
+        </p:txBody>
+      </p:sp>
+    </p:spTree>
+    <p:extLst>
+      <p:ext uri="{BB962C8B-B14F-4D97-AF65-F5344CB8AC3E}">
+        <p14:creationId xmlns:p14="http://schemas.microsoft.com/office/powerpoint/2010/main" xmlns="" val="3497500841"/>
+      </p:ext>
+    </p:extLst>
+  </p:cSld>
+  <p:clrMapOvr>
+    <a:masterClrMapping/>
+  </p:clrMapOvr>
+  <p:timing>
+    <p:tnLst>
+      <p:par>
+        <p:cTn id="1" dur="indefinite" restart="never" nodeType="tmRoot"/>
+      </p:par>
+    </p:tnLst>
+  </p:timing>
+</p:sld>
+</file>
+
+<file path=ppt/slides/slide14.xml><?xml version="1.0" encoding="utf-8"?>
 <p:sld xmlns:a="http://schemas.openxmlformats.org/drawingml/2006/main" xmlns:r="http://schemas.openxmlformats.org/officeDocument/2006/relationships" xmlns:p="http://schemas.openxmlformats.org/presentationml/2006/main">
   <p:cSld>
     <p:spTree>
@@ -28538,159 +28572,7 @@
     </p:spTree>
     <p:extLst>
       <p:ext uri="{BB962C8B-B14F-4D97-AF65-F5344CB8AC3E}">
-        <p14:creationId xmlns:p14="http://schemas.microsoft.com/office/powerpoint/2010/main" xmlns="" val="3441875744"/>
-      </p:ext>
-    </p:extLst>
-  </p:cSld>
-  <p:clrMapOvr>
-    <a:masterClrMapping/>
-  </p:clrMapOvr>
-  <p:timing>
-    <p:tnLst>
-      <p:par>
-        <p:cTn id="1" dur="indefinite" restart="never" nodeType="tmRoot"/>
-      </p:par>
-    </p:tnLst>
-  </p:timing>
-</p:sld>
-</file>
-
-<file path=ppt/slides/slide14.xml><?xml version="1.0" encoding="utf-8"?>
-<p:sld xmlns:a="http://schemas.openxmlformats.org/drawingml/2006/main" xmlns:r="http://schemas.openxmlformats.org/officeDocument/2006/relationships" xmlns:p="http://schemas.openxmlformats.org/presentationml/2006/main">
-  <p:cSld>
-    <p:spTree>
-      <p:nvGrpSpPr>
-        <p:cNvPr id="1" name=""/>
-        <p:cNvGrpSpPr/>
-        <p:nvPr/>
-      </p:nvGrpSpPr>
-      <p:grpSpPr>
-        <a:xfrm>
-          <a:off x="0" y="0"/>
-          <a:ext cx="0" cy="0"/>
-          <a:chOff x="0" y="0"/>
-          <a:chExt cx="0" cy="0"/>
-        </a:xfrm>
-      </p:grpSpPr>
-      <p:sp>
-        <p:nvSpPr>
-          <p:cNvPr id="2" name="Rectangle 1"/>
-          <p:cNvSpPr/>
-          <p:nvPr/>
-        </p:nvSpPr>
-        <p:spPr>
-          <a:xfrm>
-            <a:off x="990600" y="1625174"/>
-            <a:ext cx="6781800" cy="3216265"/>
-          </a:xfrm>
-          <a:prstGeom prst="rect">
-            <a:avLst/>
-          </a:prstGeom>
-        </p:spPr>
-        <p:txBody>
-          <a:bodyPr wrap="square">
-            <a:spAutoFit/>
-          </a:bodyPr>
-          <a:lstStyle/>
-          <a:p>
-            <a:r>
-              <a:rPr lang="fr-FR" sz="2100" b="1" dirty="0" err="1" smtClean="0"/>
-              <a:t>LibQGLViewer</a:t>
-            </a:r>
-            <a:r>
-              <a:rPr lang="fr-FR" sz="2100" b="1" dirty="0" smtClean="0"/>
-              <a:t> :</a:t>
-            </a:r>
-          </a:p>
-          <a:p>
-            <a:pPr lvl="1">
-              <a:buFont typeface="Arial" pitchFamily="34" charset="0"/>
-              <a:buChar char="•"/>
-            </a:pPr>
-            <a:r>
-              <a:rPr lang="fr-FR" sz="2400" dirty="0" smtClean="0"/>
-              <a:t> </a:t>
-            </a:r>
-            <a:r>
-              <a:rPr lang="fr-FR" sz="2400" dirty="0" smtClean="0"/>
-              <a:t> Bibliothèque </a:t>
-            </a:r>
-            <a:r>
-              <a:rPr lang="fr-FR" sz="2400" dirty="0" smtClean="0"/>
-              <a:t>C ++ basée sur </a:t>
-            </a:r>
-            <a:r>
-              <a:rPr lang="fr-FR" sz="2400" dirty="0" err="1" smtClean="0"/>
-              <a:t>Qt</a:t>
-            </a:r>
-            <a:r>
-              <a:rPr lang="fr-FR" sz="2400" dirty="0" smtClean="0"/>
-              <a:t> qui facilite la </a:t>
-            </a:r>
-            <a:r>
-              <a:rPr lang="fr-FR" sz="2400" dirty="0" smtClean="0"/>
-              <a:t>  création </a:t>
-            </a:r>
-            <a:r>
-              <a:rPr lang="fr-FR" sz="2400" dirty="0" smtClean="0"/>
-              <a:t>de la vision </a:t>
-            </a:r>
-            <a:r>
-              <a:rPr lang="fr-FR" sz="2400" dirty="0" err="1" smtClean="0"/>
-              <a:t>OpenGL</a:t>
-            </a:r>
-            <a:r>
-              <a:rPr lang="fr-FR" sz="2400" dirty="0" smtClean="0"/>
-              <a:t> 3D.</a:t>
-            </a:r>
-          </a:p>
-          <a:p>
-            <a:pPr lvl="1">
-              <a:spcBef>
-                <a:spcPts val="1200"/>
-              </a:spcBef>
-              <a:buFont typeface="Arial" pitchFamily="34" charset="0"/>
-              <a:buChar char="•"/>
-            </a:pPr>
-            <a:r>
-              <a:rPr lang="fr-FR" sz="2400" dirty="0" smtClean="0"/>
-              <a:t>  Basée </a:t>
-            </a:r>
-            <a:r>
-              <a:rPr lang="fr-FR" sz="2400" dirty="0" smtClean="0"/>
-              <a:t>sur le kit </a:t>
-            </a:r>
-            <a:r>
-              <a:rPr lang="fr-FR" sz="2400" dirty="0" err="1" smtClean="0"/>
-              <a:t>Qt</a:t>
-            </a:r>
-            <a:r>
-              <a:rPr lang="fr-FR" sz="2400" dirty="0" smtClean="0"/>
-              <a:t>, il compile sur toute architecture (Unix-Linux, Mac, Windows). </a:t>
-            </a:r>
-            <a:endParaRPr lang="fr-FR" sz="2400" dirty="0" smtClean="0"/>
-          </a:p>
-          <a:p>
-            <a:pPr lvl="1">
-              <a:spcBef>
-                <a:spcPts val="1200"/>
-              </a:spcBef>
-            </a:pPr>
-            <a:endParaRPr lang="fr-FR" sz="2400" dirty="0" smtClean="0"/>
-          </a:p>
-          <a:p>
-            <a:pPr lvl="1"/>
-            <a:endParaRPr lang="fr-FR" sz="2100" b="1" dirty="0" smtClean="0"/>
-          </a:p>
-          <a:p>
-            <a:endParaRPr lang="fr-FR" sz="2100" b="1" dirty="0" smtClean="0"/>
-          </a:p>
-        </p:txBody>
-      </p:sp>
-    </p:spTree>
-    <p:extLst>
-      <p:ext uri="{BB962C8B-B14F-4D97-AF65-F5344CB8AC3E}">
-        <p14:creationId xmlns="" xmlns:p14="http://schemas.microsoft.com/office/powerpoint/2010/main" val="2520269512"/>
+        <p14:creationId xmlns="" xmlns:p14="http://schemas.microsoft.com/office/powerpoint/2010/main" val="3441875744"/>
       </p:ext>
     </p:extLst>
   </p:cSld>
@@ -28732,8 +28614,8 @@
         </p:nvSpPr>
         <p:spPr>
           <a:xfrm>
-            <a:off x="502920" y="1735247"/>
-            <a:ext cx="7696200" cy="3970318"/>
+            <a:off x="990600" y="1625174"/>
+            <a:ext cx="6781800" cy="4539704"/>
           </a:xfrm>
           <a:prstGeom prst="rect">
             <a:avLst/>
@@ -28746,107 +28628,109 @@
           <a:lstStyle/>
           <a:p>
             <a:r>
-              <a:rPr lang="fr-FR" dirty="0" smtClean="0"/>
-              <a:t>1. Nombre d'images par seconde (lors d'un déplacement codifié de la caméra)</a:t>
-            </a:r>
-          </a:p>
-          <a:p>
-            <a:r>
-              <a:rPr lang="fr-FR" dirty="0" smtClean="0"/>
-              <a:t>1. -&gt; Temps de calcul affichage (entre demande de requête et fin de la</a:t>
-            </a:r>
-          </a:p>
-          <a:p>
-            <a:r>
-              <a:rPr lang="fr-FR" dirty="0" smtClean="0"/>
-              <a:t>      mise à jour de l'</a:t>
-            </a:r>
-            <a:r>
-              <a:rPr lang="fr-FR" dirty="0" err="1" smtClean="0"/>
-              <a:t>afffichage</a:t>
-            </a:r>
-            <a:r>
-              <a:rPr lang="fr-FR" dirty="0" smtClean="0"/>
-              <a:t>)</a:t>
-            </a:r>
-          </a:p>
-          <a:p>
-            <a:r>
-              <a:rPr lang="fr-FR" dirty="0" smtClean="0"/>
-              <a:t>1. -&gt; Temps/Vitesse des requêtes (entre réception de la demande et retour</a:t>
-            </a:r>
-          </a:p>
-          <a:p>
-            <a:r>
-              <a:rPr lang="fr-FR" dirty="0" smtClean="0"/>
-              <a:t>      de la réponse)</a:t>
-            </a:r>
-          </a:p>
-          <a:p>
-            <a:r>
-              <a:rPr lang="fr-FR" dirty="0" smtClean="0"/>
-              <a:t>1</a:t>
-            </a:r>
-            <a:r>
-              <a:rPr lang="fr-FR" dirty="0" smtClean="0"/>
-              <a:t>. Espace en mémoire vive maximal utilisé lors des requêtes</a:t>
-            </a:r>
-          </a:p>
-          <a:p>
-            <a:r>
-              <a:rPr lang="fr-FR" dirty="0" smtClean="0"/>
-              <a:t>2. Temps de calcul de création du découpage (depuis l'ouverture du</a:t>
-            </a:r>
-          </a:p>
-          <a:p>
-            <a:r>
-              <a:rPr lang="fr-FR" dirty="0" smtClean="0"/>
-              <a:t>   fichier initial jusqu'à la fin de la création de l'arbre)</a:t>
-            </a:r>
-          </a:p>
-          <a:p>
-            <a:r>
-              <a:rPr lang="fr-FR" dirty="0" smtClean="0"/>
-              <a:t>2. Rapport espace disque du nuage découpé / espace disque du nuage initial</a:t>
-            </a:r>
-          </a:p>
-          <a:p>
-            <a:r>
-              <a:rPr lang="fr-FR" dirty="0" smtClean="0"/>
-              <a:t>2. Espace mémoire vive maximal utilisé lors de la construction de l'arbre</a:t>
-            </a:r>
-          </a:p>
-          <a:p>
-            <a:r>
-              <a:rPr lang="fr-FR" dirty="0" smtClean="0"/>
-              <a:t>2. -&gt; Espace mémoire vive maximal utilisé lors de la lecture des données</a:t>
-            </a:r>
-          </a:p>
-          <a:p>
-            <a:r>
-              <a:rPr lang="fr-FR" dirty="0" smtClean="0"/>
-              <a:t>2. -&gt; Hauteur de l'arbre</a:t>
-            </a:r>
-          </a:p>
-          <a:p>
-            <a:r>
-              <a:rPr lang="fr-FR" dirty="0" smtClean="0"/>
-              <a:t>3. Temps de rééquilibrage = reconstruction de l'arbre lors d'ajout de</a:t>
-            </a:r>
-          </a:p>
-          <a:p>
-            <a:r>
-              <a:rPr lang="fr-FR" dirty="0" smtClean="0"/>
-              <a:t>point</a:t>
-            </a:r>
-            <a:endParaRPr lang="fr-FR" dirty="0"/>
+              <a:rPr lang="fr-FR" sz="2100" b="1" dirty="0" err="1" smtClean="0"/>
+              <a:t>LibQGLViewer</a:t>
+            </a:r>
+            <a:r>
+              <a:rPr lang="fr-FR" sz="2100" b="1" dirty="0" smtClean="0"/>
+              <a:t> :</a:t>
+            </a:r>
+          </a:p>
+          <a:p>
+            <a:pPr lvl="1">
+              <a:buFont typeface="Arial" pitchFamily="34" charset="0"/>
+              <a:buChar char="•"/>
+            </a:pPr>
+            <a:r>
+              <a:rPr lang="fr-FR" sz="2400" dirty="0" smtClean="0"/>
+              <a:t>  Bibliothèque C ++ basée sur </a:t>
+            </a:r>
+            <a:r>
+              <a:rPr lang="fr-FR" sz="2400" dirty="0" err="1" smtClean="0"/>
+              <a:t>Qt</a:t>
+            </a:r>
+            <a:r>
+              <a:rPr lang="fr-FR" sz="2400" dirty="0" smtClean="0"/>
+              <a:t> qui facilite la   création de la vision </a:t>
+            </a:r>
+            <a:r>
+              <a:rPr lang="fr-FR" sz="2400" dirty="0" err="1" smtClean="0"/>
+              <a:t>OpenGL</a:t>
+            </a:r>
+            <a:r>
+              <a:rPr lang="fr-FR" sz="2400" dirty="0" smtClean="0"/>
+              <a:t> 3D.</a:t>
+            </a:r>
+          </a:p>
+          <a:p>
+            <a:pPr lvl="1">
+              <a:spcBef>
+                <a:spcPts val="1200"/>
+              </a:spcBef>
+              <a:buFont typeface="Arial" pitchFamily="34" charset="0"/>
+              <a:buChar char="•"/>
+            </a:pPr>
+            <a:r>
+              <a:rPr lang="fr-FR" sz="2400" dirty="0" smtClean="0"/>
+              <a:t>  Basée sur le kit </a:t>
+            </a:r>
+            <a:r>
+              <a:rPr lang="fr-FR" sz="2400" dirty="0" err="1" smtClean="0"/>
+              <a:t>Qt</a:t>
+            </a:r>
+            <a:r>
+              <a:rPr lang="fr-FR" sz="2400" dirty="0" smtClean="0"/>
+              <a:t>, il compile sur toute architecture (Unix-Linux, Mac, Windows). </a:t>
+            </a:r>
+          </a:p>
+          <a:p>
+            <a:pPr>
+              <a:spcBef>
+                <a:spcPts val="1200"/>
+              </a:spcBef>
+            </a:pPr>
+            <a:r>
+              <a:rPr lang="fr-FR" sz="2100" b="1" dirty="0" smtClean="0"/>
+              <a:t>Programmation de la classe camera qui fait appelle à la bibliothèque </a:t>
+            </a:r>
+            <a:r>
+              <a:rPr lang="fr-FR" sz="2100" b="1" dirty="0" err="1" smtClean="0"/>
+              <a:t>OpenGL</a:t>
+            </a:r>
+            <a:r>
+              <a:rPr lang="fr-FR" sz="2100" b="1" dirty="0" smtClean="0"/>
+              <a:t> Mathématiques ( GLM ) .</a:t>
+            </a:r>
+          </a:p>
+          <a:p>
+            <a:pPr lvl="1">
+              <a:spcBef>
+                <a:spcPts val="1200"/>
+              </a:spcBef>
+            </a:pPr>
+            <a:endParaRPr lang="fr-FR" sz="2400" dirty="0" smtClean="0"/>
+          </a:p>
+          <a:p>
+            <a:pPr lvl="1">
+              <a:spcBef>
+                <a:spcPts val="1200"/>
+              </a:spcBef>
+            </a:pPr>
+            <a:endParaRPr lang="fr-FR" sz="2400" dirty="0" smtClean="0"/>
+          </a:p>
+          <a:p>
+            <a:pPr lvl="1"/>
+            <a:endParaRPr lang="fr-FR" sz="2100" b="1" dirty="0" smtClean="0"/>
+          </a:p>
+          <a:p>
+            <a:endParaRPr lang="fr-FR" sz="2100" b="1" dirty="0" smtClean="0"/>
           </a:p>
         </p:txBody>
       </p:sp>
     </p:spTree>
     <p:extLst>
       <p:ext uri="{BB962C8B-B14F-4D97-AF65-F5344CB8AC3E}">
-        <p14:creationId xmlns="" xmlns:p14="http://schemas.microsoft.com/office/powerpoint/2010/main" val="1577900831"/>
+        <p14:creationId xmlns:p14="http://schemas.microsoft.com/office/powerpoint/2010/main" xmlns="" val="2520269512"/>
       </p:ext>
     </p:extLst>
   </p:cSld>
@@ -28882,100 +28766,139 @@
       </p:grpSpPr>
       <p:sp>
         <p:nvSpPr>
-          <p:cNvPr id="5" name="ZoneTexte 4"/>
-          <p:cNvSpPr txBox="1"/>
+          <p:cNvPr id="4" name="Rectangle 3"/>
+          <p:cNvSpPr/>
           <p:nvPr/>
         </p:nvSpPr>
         <p:spPr>
           <a:xfrm>
-            <a:off x="1153235" y="1557905"/>
-            <a:ext cx="6858000" cy="2169825"/>
+            <a:off x="762000" y="1203959"/>
+            <a:ext cx="10332720" cy="5078313"/>
           </a:xfrm>
           <a:prstGeom prst="rect">
             <a:avLst/>
           </a:prstGeom>
-          <a:noFill/>
         </p:spPr>
         <p:txBody>
-          <a:bodyPr wrap="square" numCol="1" rtlCol="0">
+          <a:bodyPr wrap="square">
             <a:spAutoFit/>
           </a:bodyPr>
           <a:lstStyle/>
           <a:p>
-            <a:pPr marL="728663" lvl="1" indent="-385763" algn="just">
-              <a:lnSpc>
-                <a:spcPct val="150000"/>
-              </a:lnSpc>
-              <a:buFont typeface="+mj-lt"/>
-              <a:buAutoNum type="arabicPeriod"/>
-            </a:pPr>
-            <a:r>
-              <a:rPr lang="fr-FR" sz="2700" dirty="0">
-                <a:solidFill>
-                  <a:schemeClr val="bg1">
-                    <a:lumMod val="95000"/>
-                  </a:schemeClr>
-                </a:solidFill>
-              </a:rPr>
-              <a:t>Contexte et objectif</a:t>
-            </a:r>
-          </a:p>
-          <a:p>
-            <a:pPr marL="728663" lvl="1" indent="-385763" algn="just">
-              <a:lnSpc>
-                <a:spcPct val="150000"/>
-              </a:lnSpc>
-              <a:buFont typeface="+mj-lt"/>
-              <a:buAutoNum type="arabicPeriod"/>
-            </a:pPr>
-            <a:r>
-              <a:rPr lang="fr-FR" sz="2700" dirty="0">
-                <a:solidFill>
-                  <a:schemeClr val="bg1">
-                    <a:lumMod val="95000"/>
-                  </a:schemeClr>
-                </a:solidFill>
-              </a:rPr>
-              <a:t>Analyses</a:t>
-            </a:r>
-          </a:p>
-          <a:p>
-            <a:pPr marL="685800" lvl="1" indent="-342900">
-              <a:buFont typeface="+mj-lt"/>
-              <a:buAutoNum type="arabicPeriod"/>
-            </a:pPr>
-            <a:r>
-              <a:rPr lang="fr-FR" sz="2700" dirty="0">
-                <a:solidFill>
-                  <a:schemeClr val="bg1">
-                    <a:lumMod val="95000"/>
-                  </a:schemeClr>
-                </a:solidFill>
-              </a:rPr>
-              <a:t> Solution technique </a:t>
-            </a:r>
-          </a:p>
-          <a:p>
-            <a:pPr marL="685800" lvl="1" indent="-342900">
-              <a:buFont typeface="+mj-lt"/>
-              <a:buAutoNum type="arabicPeriod"/>
-            </a:pPr>
-            <a:r>
-              <a:rPr lang="fr-FR" sz="2700" dirty="0"/>
-              <a:t>Gestion du </a:t>
-            </a:r>
-            <a:r>
-              <a:rPr lang="fr-FR" sz="2700" dirty="0" smtClean="0"/>
-              <a:t>projet</a:t>
-            </a:r>
-            <a:endParaRPr lang="fr-FR" sz="2700" dirty="0"/>
+            <a:r>
+              <a:rPr lang="fr-FR" dirty="0" smtClean="0"/>
+              <a:t>1. Nombre d'images par seconde (lors d'un déplacement codifié de la</a:t>
+            </a:r>
+          </a:p>
+          <a:p>
+            <a:r>
+              <a:rPr lang="fr-FR" dirty="0" smtClean="0"/>
+              <a:t>caméra)</a:t>
+            </a:r>
+          </a:p>
+          <a:p>
+            <a:r>
+              <a:rPr lang="fr-FR" dirty="0" smtClean="0"/>
+              <a:t>1. Nombre d'images par secondes en caméra statique.</a:t>
+            </a:r>
+          </a:p>
+          <a:p>
+            <a:r>
+              <a:rPr lang="fr-FR" dirty="0" smtClean="0"/>
+              <a:t>(1. -&gt; Temps de calcul affichage (entre demande de requête et fin de la</a:t>
+            </a:r>
+          </a:p>
+          <a:p>
+            <a:r>
+              <a:rPr lang="fr-FR" dirty="0" smtClean="0"/>
+              <a:t>      mise à jour de l'affichage) -&gt; ce n'est pas un bon indicateur</a:t>
+            </a:r>
+          </a:p>
+          <a:p>
+            <a:r>
+              <a:rPr lang="fr-FR" dirty="0" smtClean="0"/>
+              <a:t>      car il dépend de deux opérations différentes : d'une part la</a:t>
+            </a:r>
+          </a:p>
+          <a:p>
+            <a:r>
+              <a:rPr lang="fr-FR" dirty="0" smtClean="0"/>
+              <a:t>      librairie qui implémente la caméra, et d'autre part nos propres</a:t>
+            </a:r>
+          </a:p>
+          <a:p>
+            <a:r>
+              <a:rPr lang="fr-FR" dirty="0" smtClean="0"/>
+              <a:t>      méthodes de requête.)</a:t>
+            </a:r>
+          </a:p>
+          <a:p>
+            <a:r>
+              <a:rPr lang="fr-FR" dirty="0" smtClean="0"/>
+              <a:t>1. -&gt; Temps/Vitesse des requêtes (entre réception de la demande et retour</a:t>
+            </a:r>
+          </a:p>
+          <a:p>
+            <a:r>
+              <a:rPr lang="fr-FR" dirty="0" smtClean="0"/>
+              <a:t>      de la réponse)</a:t>
+            </a:r>
+          </a:p>
+          <a:p>
+            <a:r>
+              <a:rPr lang="fr-FR" dirty="0" smtClean="0"/>
+              <a:t>1. Espace en mémoire vive maximal utilisé lors des requêtes</a:t>
+            </a:r>
+          </a:p>
+          <a:p>
+            <a:r>
+              <a:rPr lang="fr-FR" dirty="0" smtClean="0"/>
+              <a:t>   Remarque : on ne pourra pas tout stocker en mémoire : faire le calcul</a:t>
+            </a:r>
+          </a:p>
+          <a:p>
+            <a:r>
+              <a:rPr lang="fr-FR" dirty="0" smtClean="0"/>
+              <a:t>2. Temps de calcul de création du découpage (depuis l'ouverture du</a:t>
+            </a:r>
+          </a:p>
+          <a:p>
+            <a:r>
+              <a:rPr lang="fr-FR" dirty="0" smtClean="0"/>
+              <a:t>   fichier initial jusqu'à la fin de la création de l'arbre)</a:t>
+            </a:r>
+          </a:p>
+          <a:p>
+            <a:r>
+              <a:rPr lang="fr-FR" dirty="0" smtClean="0"/>
+              <a:t>2. Rapport espace disque du nuage découpé / espace disque du nuage initial</a:t>
+            </a:r>
+          </a:p>
+          <a:p>
+            <a:r>
+              <a:rPr lang="fr-FR" dirty="0" smtClean="0"/>
+              <a:t>2. Espace mémoire vive maximal utilisé lors de la construction de l'arbre</a:t>
+            </a:r>
+          </a:p>
+          <a:p>
+            <a:r>
+              <a:rPr lang="fr-FR" dirty="0" smtClean="0"/>
+              <a:t>2. -&gt; Espace mémoire vive maximal utilisé lors de la lecture des données</a:t>
+            </a:r>
+          </a:p>
+          <a:p>
+            <a:r>
+              <a:rPr lang="fr-FR" dirty="0" smtClean="0"/>
+              <a:t>2. -&gt; Hauteur de l'arbre</a:t>
+            </a:r>
+            <a:endParaRPr lang="fr-FR" dirty="0"/>
           </a:p>
         </p:txBody>
       </p:sp>
     </p:spTree>
     <p:extLst>
       <p:ext uri="{BB962C8B-B14F-4D97-AF65-F5344CB8AC3E}">
-        <p14:creationId xmlns="" xmlns:p14="http://schemas.microsoft.com/office/powerpoint/2010/main" val="2981372101"/>
+        <p14:creationId xmlns:p14="http://schemas.microsoft.com/office/powerpoint/2010/main" xmlns="" val="1577900831"/>
       </p:ext>
     </p:extLst>
   </p:cSld>
@@ -28993,6 +28916,135 @@
 </file>
 
 <file path=ppt/slides/slide17.xml><?xml version="1.0" encoding="utf-8"?>
+<p:sld xmlns:a="http://schemas.openxmlformats.org/drawingml/2006/main" xmlns:r="http://schemas.openxmlformats.org/officeDocument/2006/relationships" xmlns:p="http://schemas.openxmlformats.org/presentationml/2006/main">
+  <p:cSld>
+    <p:spTree>
+      <p:nvGrpSpPr>
+        <p:cNvPr id="1" name=""/>
+        <p:cNvGrpSpPr/>
+        <p:nvPr/>
+      </p:nvGrpSpPr>
+      <p:grpSpPr>
+        <a:xfrm>
+          <a:off x="0" y="0"/>
+          <a:ext cx="0" cy="0"/>
+          <a:chOff x="0" y="0"/>
+          <a:chExt cx="0" cy="0"/>
+        </a:xfrm>
+      </p:grpSpPr>
+      <p:sp>
+        <p:nvSpPr>
+          <p:cNvPr id="5" name="ZoneTexte 4"/>
+          <p:cNvSpPr txBox="1"/>
+          <p:nvPr/>
+        </p:nvSpPr>
+        <p:spPr>
+          <a:xfrm>
+            <a:off x="1153235" y="1557905"/>
+            <a:ext cx="6858000" cy="2169825"/>
+          </a:xfrm>
+          <a:prstGeom prst="rect">
+            <a:avLst/>
+          </a:prstGeom>
+          <a:noFill/>
+        </p:spPr>
+        <p:txBody>
+          <a:bodyPr wrap="square" numCol="1" rtlCol="0">
+            <a:spAutoFit/>
+          </a:bodyPr>
+          <a:lstStyle/>
+          <a:p>
+            <a:pPr marL="728663" lvl="1" indent="-385763" algn="just">
+              <a:lnSpc>
+                <a:spcPct val="150000"/>
+              </a:lnSpc>
+              <a:buFont typeface="+mj-lt"/>
+              <a:buAutoNum type="arabicPeriod"/>
+            </a:pPr>
+            <a:r>
+              <a:rPr lang="fr-FR" sz="2700" dirty="0">
+                <a:solidFill>
+                  <a:schemeClr val="bg1">
+                    <a:lumMod val="95000"/>
+                  </a:schemeClr>
+                </a:solidFill>
+              </a:rPr>
+              <a:t>Contexte et objectif</a:t>
+            </a:r>
+          </a:p>
+          <a:p>
+            <a:pPr marL="728663" lvl="1" indent="-385763" algn="just">
+              <a:lnSpc>
+                <a:spcPct val="150000"/>
+              </a:lnSpc>
+              <a:buFont typeface="+mj-lt"/>
+              <a:buAutoNum type="arabicPeriod"/>
+            </a:pPr>
+            <a:r>
+              <a:rPr lang="fr-FR" sz="2700" dirty="0">
+                <a:solidFill>
+                  <a:schemeClr val="bg1">
+                    <a:lumMod val="95000"/>
+                  </a:schemeClr>
+                </a:solidFill>
+              </a:rPr>
+              <a:t>Analyses</a:t>
+            </a:r>
+          </a:p>
+          <a:p>
+            <a:pPr marL="685800" lvl="1" indent="-342900">
+              <a:buFont typeface="+mj-lt"/>
+              <a:buAutoNum type="arabicPeriod"/>
+            </a:pPr>
+            <a:r>
+              <a:rPr lang="fr-FR" sz="2700" dirty="0">
+                <a:solidFill>
+                  <a:schemeClr val="bg1">
+                    <a:lumMod val="95000"/>
+                  </a:schemeClr>
+                </a:solidFill>
+              </a:rPr>
+              <a:t> Solution technique </a:t>
+            </a:r>
+          </a:p>
+          <a:p>
+            <a:pPr marL="685800" lvl="1" indent="-342900">
+              <a:buFont typeface="+mj-lt"/>
+              <a:buAutoNum type="arabicPeriod"/>
+            </a:pPr>
+            <a:r>
+              <a:rPr lang="fr-FR" sz="2700" dirty="0"/>
+              <a:t>Gestion du </a:t>
+            </a:r>
+            <a:r>
+              <a:rPr lang="fr-FR" sz="2700" dirty="0" smtClean="0"/>
+              <a:t>projet</a:t>
+            </a:r>
+            <a:endParaRPr lang="fr-FR" sz="2700" dirty="0"/>
+          </a:p>
+        </p:txBody>
+      </p:sp>
+    </p:spTree>
+    <p:extLst>
+      <p:ext uri="{BB962C8B-B14F-4D97-AF65-F5344CB8AC3E}">
+        <p14:creationId xmlns:p14="http://schemas.microsoft.com/office/powerpoint/2010/main" xmlns="" val="2981372101"/>
+      </p:ext>
+    </p:extLst>
+  </p:cSld>
+  <p:clrMapOvr>
+    <a:masterClrMapping/>
+  </p:clrMapOvr>
+  <p:timing>
+    <p:tnLst>
+      <p:par>
+        <p:cTn id="1" dur="indefinite" restart="never" nodeType="tmRoot"/>
+      </p:par>
+    </p:tnLst>
+  </p:timing>
+</p:sld>
+</file>
+
+<file path=ppt/slides/slide18.xml><?xml version="1.0" encoding="utf-8"?>
 <p:sld xmlns:a="http://schemas.openxmlformats.org/drawingml/2006/main" xmlns:r="http://schemas.openxmlformats.org/officeDocument/2006/relationships" xmlns:p="http://schemas.openxmlformats.org/presentationml/2006/main">
   <p:cSld>
     <p:spTree>
@@ -29333,7 +29385,7 @@
     </p:spTree>
     <p:extLst>
       <p:ext uri="{BB962C8B-B14F-4D97-AF65-F5344CB8AC3E}">
-        <p14:creationId xmlns="" xmlns:p14="http://schemas.microsoft.com/office/powerpoint/2010/main" val="630478212"/>
+        <p14:creationId xmlns:p14="http://schemas.microsoft.com/office/powerpoint/2010/main" xmlns="" val="630478212"/>
       </p:ext>
     </p:extLst>
   </p:cSld>
@@ -29350,7 +29402,7 @@
 </p:sld>
 </file>
 
-<file path=ppt/slides/slide18.xml><?xml version="1.0" encoding="utf-8"?>
+<file path=ppt/slides/slide19.xml><?xml version="1.0" encoding="utf-8"?>
 <p:sld xmlns:a="http://schemas.openxmlformats.org/drawingml/2006/main" xmlns:r="http://schemas.openxmlformats.org/officeDocument/2006/relationships" xmlns:p="http://schemas.openxmlformats.org/presentationml/2006/main">
   <p:cSld>
     <p:spTree>
@@ -29500,7 +29552,7 @@
           <a:blip r:embed="rId2">
             <a:extLst>
               <a:ext uri="{28A0092B-C50C-407E-A947-70E740481C1C}">
-                <a14:useLocalDpi xmlns="" xmlns:a14="http://schemas.microsoft.com/office/drawing/2010/main" val="0"/>
+                <a14:useLocalDpi xmlns:a14="http://schemas.microsoft.com/office/drawing/2010/main" xmlns="" val="0"/>
               </a:ext>
             </a:extLst>
           </a:blip>
@@ -29530,7 +29582,7 @@
           <a:blip r:embed="rId3">
             <a:extLst>
               <a:ext uri="{28A0092B-C50C-407E-A947-70E740481C1C}">
-                <a14:useLocalDpi xmlns="" xmlns:a14="http://schemas.microsoft.com/office/drawing/2010/main" val="0"/>
+                <a14:useLocalDpi xmlns:a14="http://schemas.microsoft.com/office/drawing/2010/main" xmlns="" val="0"/>
               </a:ext>
             </a:extLst>
           </a:blip>
@@ -29551,7 +29603,7 @@
     </p:spTree>
     <p:extLst>
       <p:ext uri="{BB962C8B-B14F-4D97-AF65-F5344CB8AC3E}">
-        <p14:creationId xmlns="" xmlns:p14="http://schemas.microsoft.com/office/powerpoint/2010/main" val="2363380089"/>
+        <p14:creationId xmlns:p14="http://schemas.microsoft.com/office/powerpoint/2010/main" xmlns="" val="2363380089"/>
       </p:ext>
     </p:extLst>
   </p:cSld>
@@ -29636,100 +29688,6 @@
 </p:sld>
 </file>
 
-<file path=ppt/slides/slide19.xml><?xml version="1.0" encoding="utf-8"?>
-<p:sld xmlns:a="http://schemas.openxmlformats.org/drawingml/2006/main" xmlns:r="http://schemas.openxmlformats.org/officeDocument/2006/relationships" xmlns:p="http://schemas.openxmlformats.org/presentationml/2006/main">
-  <p:cSld>
-    <p:spTree>
-      <p:nvGrpSpPr>
-        <p:cNvPr id="1" name=""/>
-        <p:cNvGrpSpPr/>
-        <p:nvPr/>
-      </p:nvGrpSpPr>
-      <p:grpSpPr>
-        <a:xfrm>
-          <a:off x="0" y="0"/>
-          <a:ext cx="0" cy="0"/>
-          <a:chOff x="0" y="0"/>
-          <a:chExt cx="0" cy="0"/>
-        </a:xfrm>
-      </p:grpSpPr>
-      <p:sp>
-        <p:nvSpPr>
-          <p:cNvPr id="2" name="Titre 1"/>
-          <p:cNvSpPr>
-            <a:spLocks noGrp="1"/>
-          </p:cNvSpPr>
-          <p:nvPr>
-            <p:ph type="ctrTitle"/>
-          </p:nvPr>
-        </p:nvSpPr>
-        <p:spPr>
-          <a:xfrm>
-            <a:off x="685800" y="1808163"/>
-            <a:ext cx="7772400" cy="2387600"/>
-          </a:xfrm>
-        </p:spPr>
-        <p:txBody>
-          <a:bodyPr/>
-          <a:lstStyle/>
-          <a:p>
-            <a:r>
-              <a:rPr lang="fr-FR" dirty="0" smtClean="0"/>
-              <a:t>Merci Pour Votre Attention</a:t>
-            </a:r>
-            <a:endParaRPr lang="fr-FR" dirty="0"/>
-          </a:p>
-        </p:txBody>
-      </p:sp>
-      <p:sp>
-        <p:nvSpPr>
-          <p:cNvPr id="4" name="Espace réservé du numéro de diapositive 3"/>
-          <p:cNvSpPr>
-            <a:spLocks noGrp="1"/>
-          </p:cNvSpPr>
-          <p:nvPr>
-            <p:ph type="sldNum" sz="quarter" idx="12"/>
-          </p:nvPr>
-        </p:nvSpPr>
-        <p:spPr>
-          <a:xfrm>
-            <a:off x="6457950" y="5624513"/>
-            <a:ext cx="2057400" cy="273844"/>
-          </a:xfrm>
-        </p:spPr>
-        <p:txBody>
-          <a:bodyPr/>
-          <a:lstStyle/>
-          <a:p>
-            <a:fld id="{132B277A-E52E-4AED-BCF8-1E5F38ED84D2}" type="slidenum">
-              <a:rPr lang="fr-FR" smtClean="0"/>
-              <a:pPr/>
-              <a:t>19</a:t>
-            </a:fld>
-            <a:endParaRPr lang="fr-FR"/>
-          </a:p>
-        </p:txBody>
-      </p:sp>
-    </p:spTree>
-    <p:extLst>
-      <p:ext uri="{BB962C8B-B14F-4D97-AF65-F5344CB8AC3E}">
-        <p14:creationId xmlns="" xmlns:p14="http://schemas.microsoft.com/office/powerpoint/2010/main" val="3959360915"/>
-      </p:ext>
-    </p:extLst>
-  </p:cSld>
-  <p:clrMapOvr>
-    <a:masterClrMapping/>
-  </p:clrMapOvr>
-  <p:timing>
-    <p:tnLst>
-      <p:par>
-        <p:cTn id="1" dur="indefinite" restart="never" nodeType="tmRoot"/>
-      </p:par>
-    </p:tnLst>
-  </p:timing>
-</p:sld>
-</file>
-
 <file path=ppt/slides/slide2.xml><?xml version="1.0" encoding="utf-8"?>
 <p:sld xmlns:a="http://schemas.openxmlformats.org/drawingml/2006/main" xmlns:r="http://schemas.openxmlformats.org/officeDocument/2006/relationships" xmlns:p="http://schemas.openxmlformats.org/presentationml/2006/main">
   <p:cSld>
@@ -29831,7 +29789,101 @@
     </p:spTree>
     <p:extLst>
       <p:ext uri="{BB962C8B-B14F-4D97-AF65-F5344CB8AC3E}">
-        <p14:creationId xmlns="" xmlns:p14="http://schemas.microsoft.com/office/powerpoint/2010/main" val="4030221437"/>
+        <p14:creationId xmlns:p14="http://schemas.microsoft.com/office/powerpoint/2010/main" xmlns="" val="4030221437"/>
+      </p:ext>
+    </p:extLst>
+  </p:cSld>
+  <p:clrMapOvr>
+    <a:masterClrMapping/>
+  </p:clrMapOvr>
+  <p:timing>
+    <p:tnLst>
+      <p:par>
+        <p:cTn id="1" dur="indefinite" restart="never" nodeType="tmRoot"/>
+      </p:par>
+    </p:tnLst>
+  </p:timing>
+</p:sld>
+</file>
+
+<file path=ppt/slides/slide20.xml><?xml version="1.0" encoding="utf-8"?>
+<p:sld xmlns:a="http://schemas.openxmlformats.org/drawingml/2006/main" xmlns:r="http://schemas.openxmlformats.org/officeDocument/2006/relationships" xmlns:p="http://schemas.openxmlformats.org/presentationml/2006/main">
+  <p:cSld>
+    <p:spTree>
+      <p:nvGrpSpPr>
+        <p:cNvPr id="1" name=""/>
+        <p:cNvGrpSpPr/>
+        <p:nvPr/>
+      </p:nvGrpSpPr>
+      <p:grpSpPr>
+        <a:xfrm>
+          <a:off x="0" y="0"/>
+          <a:ext cx="0" cy="0"/>
+          <a:chOff x="0" y="0"/>
+          <a:chExt cx="0" cy="0"/>
+        </a:xfrm>
+      </p:grpSpPr>
+      <p:sp>
+        <p:nvSpPr>
+          <p:cNvPr id="2" name="Titre 1"/>
+          <p:cNvSpPr>
+            <a:spLocks noGrp="1"/>
+          </p:cNvSpPr>
+          <p:nvPr>
+            <p:ph type="ctrTitle"/>
+          </p:nvPr>
+        </p:nvSpPr>
+        <p:spPr>
+          <a:xfrm>
+            <a:off x="685800" y="1808163"/>
+            <a:ext cx="7772400" cy="2387600"/>
+          </a:xfrm>
+        </p:spPr>
+        <p:txBody>
+          <a:bodyPr/>
+          <a:lstStyle/>
+          <a:p>
+            <a:r>
+              <a:rPr lang="fr-FR" dirty="0" smtClean="0"/>
+              <a:t>Merci Pour Votre Attention</a:t>
+            </a:r>
+            <a:endParaRPr lang="fr-FR" dirty="0"/>
+          </a:p>
+        </p:txBody>
+      </p:sp>
+      <p:sp>
+        <p:nvSpPr>
+          <p:cNvPr id="4" name="Espace réservé du numéro de diapositive 3"/>
+          <p:cNvSpPr>
+            <a:spLocks noGrp="1"/>
+          </p:cNvSpPr>
+          <p:nvPr>
+            <p:ph type="sldNum" sz="quarter" idx="12"/>
+          </p:nvPr>
+        </p:nvSpPr>
+        <p:spPr>
+          <a:xfrm>
+            <a:off x="6457950" y="5624513"/>
+            <a:ext cx="2057400" cy="273844"/>
+          </a:xfrm>
+        </p:spPr>
+        <p:txBody>
+          <a:bodyPr/>
+          <a:lstStyle/>
+          <a:p>
+            <a:fld id="{132B277A-E52E-4AED-BCF8-1E5F38ED84D2}" type="slidenum">
+              <a:rPr lang="fr-FR" smtClean="0"/>
+              <a:pPr/>
+              <a:t>20</a:t>
+            </a:fld>
+            <a:endParaRPr lang="fr-FR"/>
+          </a:p>
+        </p:txBody>
+      </p:sp>
+    </p:spTree>
+    <p:extLst>
+      <p:ext uri="{BB962C8B-B14F-4D97-AF65-F5344CB8AC3E}">
+        <p14:creationId xmlns:p14="http://schemas.microsoft.com/office/powerpoint/2010/main" xmlns="" val="3959360915"/>
       </p:ext>
     </p:extLst>
   </p:cSld>
@@ -29975,7 +30027,7 @@
     </p:spTree>
     <p:extLst>
       <p:ext uri="{BB962C8B-B14F-4D97-AF65-F5344CB8AC3E}">
-        <p14:creationId xmlns="" xmlns:p14="http://schemas.microsoft.com/office/powerpoint/2010/main" val="690041990"/>
+        <p14:creationId xmlns:p14="http://schemas.microsoft.com/office/powerpoint/2010/main" xmlns="" val="690041990"/>
       </p:ext>
     </p:extLst>
   </p:cSld>
@@ -30120,7 +30172,7 @@
     </p:spTree>
     <p:extLst>
       <p:ext uri="{BB962C8B-B14F-4D97-AF65-F5344CB8AC3E}">
-        <p14:creationId xmlns="" xmlns:p14="http://schemas.microsoft.com/office/powerpoint/2010/main" val="1737360079"/>
+        <p14:creationId xmlns:p14="http://schemas.microsoft.com/office/powerpoint/2010/main" xmlns="" val="1737360079"/>
       </p:ext>
     </p:extLst>
   </p:cSld>
@@ -30350,7 +30402,7 @@
     </p:spTree>
     <p:extLst>
       <p:ext uri="{BB962C8B-B14F-4D97-AF65-F5344CB8AC3E}">
-        <p14:creationId xmlns="" xmlns:p14="http://schemas.microsoft.com/office/powerpoint/2010/main" val="1915336640"/>
+        <p14:creationId xmlns:p14="http://schemas.microsoft.com/office/powerpoint/2010/main" xmlns="" val="1915336640"/>
       </p:ext>
     </p:extLst>
   </p:cSld>
@@ -30441,7 +30493,7 @@
           <a:blip r:embed="rId3">
             <a:extLst>
               <a:ext uri="{28A0092B-C50C-407E-A947-70E740481C1C}">
-                <a14:useLocalDpi xmlns="" xmlns:a14="http://schemas.microsoft.com/office/drawing/2010/main" val="0"/>
+                <a14:useLocalDpi xmlns:a14="http://schemas.microsoft.com/office/drawing/2010/main" xmlns="" val="0"/>
               </a:ext>
             </a:extLst>
           </a:blip>
@@ -30462,7 +30514,7 @@
     </p:spTree>
     <p:extLst>
       <p:ext uri="{BB962C8B-B14F-4D97-AF65-F5344CB8AC3E}">
-        <p14:creationId xmlns="" xmlns:p14="http://schemas.microsoft.com/office/powerpoint/2010/main" val="229758348"/>
+        <p14:creationId xmlns:p14="http://schemas.microsoft.com/office/powerpoint/2010/main" xmlns="" val="229758348"/>
       </p:ext>
     </p:extLst>
   </p:cSld>
@@ -30524,11 +30576,7 @@
             </a:r>
             <a:r>
               <a:rPr lang="fr-FR" sz="2400" b="1" dirty="0" smtClean="0"/>
-              <a:t>1 : </a:t>
-            </a:r>
-            <a:r>
-              <a:rPr lang="fr-FR" sz="2400" b="1" dirty="0" smtClean="0"/>
-              <a:t>Lire les </a:t>
+              <a:t>1 : Lire les </a:t>
             </a:r>
             <a:r>
               <a:rPr lang="fr-FR" sz="2400" b="1" dirty="0"/>
@@ -30634,7 +30682,7 @@
     </p:spTree>
     <p:extLst>
       <p:ext uri="{BB962C8B-B14F-4D97-AF65-F5344CB8AC3E}">
-        <p14:creationId xmlns="" xmlns:p14="http://schemas.microsoft.com/office/powerpoint/2010/main" val="2005674513"/>
+        <p14:creationId xmlns:p14="http://schemas.microsoft.com/office/powerpoint/2010/main" xmlns="" val="2005674513"/>
       </p:ext>
     </p:extLst>
   </p:cSld>
@@ -30777,7 +30825,7 @@
             <a:blip r:embed="rId2">
               <a:extLst>
                 <a:ext uri="{28A0092B-C50C-407E-A947-70E740481C1C}">
-                  <a14:useLocalDpi xmlns="" xmlns:a14="http://schemas.microsoft.com/office/drawing/2010/main" val="0"/>
+                  <a14:useLocalDpi xmlns:a14="http://schemas.microsoft.com/office/drawing/2010/main" xmlns="" val="0"/>
                 </a:ext>
               </a:extLst>
             </a:blip>
@@ -30997,7 +31045,7 @@
     </p:spTree>
     <p:extLst>
       <p:ext uri="{BB962C8B-B14F-4D97-AF65-F5344CB8AC3E}">
-        <p14:creationId xmlns="" xmlns:p14="http://schemas.microsoft.com/office/powerpoint/2010/main" val="215141730"/>
+        <p14:creationId xmlns:p14="http://schemas.microsoft.com/office/powerpoint/2010/main" xmlns="" val="215141730"/>
       </p:ext>
     </p:extLst>
   </p:cSld>
@@ -31152,7 +31200,7 @@
           <a:blip r:embed="rId2">
             <a:extLst>
               <a:ext uri="{28A0092B-C50C-407E-A947-70E740481C1C}">
-                <a14:useLocalDpi xmlns="" xmlns:a14="http://schemas.microsoft.com/office/drawing/2010/main" val="0"/>
+                <a14:useLocalDpi xmlns:a14="http://schemas.microsoft.com/office/drawing/2010/main" xmlns="" val="0"/>
               </a:ext>
             </a:extLst>
           </a:blip>
@@ -31173,7 +31221,7 @@
     </p:spTree>
     <p:extLst>
       <p:ext uri="{BB962C8B-B14F-4D97-AF65-F5344CB8AC3E}">
-        <p14:creationId xmlns="" xmlns:p14="http://schemas.microsoft.com/office/powerpoint/2010/main" val="3621779543"/>
+        <p14:creationId xmlns:p14="http://schemas.microsoft.com/office/powerpoint/2010/main" xmlns="" val="3621779543"/>
       </p:ext>
     </p:extLst>
   </p:cSld>
@@ -31445,7 +31493,7 @@
   <a:extraClrSchemeLst/>
   <a:extLst>
     <a:ext uri="{05A4C25C-085E-4340-85A3-A5531E510DB2}">
-      <thm15:themeFamily xmlns="" xmlns:thm15="http://schemas.microsoft.com/office/thememl/2012/main" name="Office Theme" id="{62F939B6-93AF-4DB8-9C6B-D6C7DFDC589F}" vid="{4A3C46E8-61CC-4603-A589-7422A47A8E4A}"/>
+      <thm15:themeFamily xmlns:thm15="http://schemas.microsoft.com/office/thememl/2012/main" xmlns="" name="Office Theme" id="{62F939B6-93AF-4DB8-9C6B-D6C7DFDC589F}" vid="{4A3C46E8-61CC-4603-A589-7422A47A8E4A}"/>
     </a:ext>
   </a:extLst>
 </a:theme>
@@ -31706,7 +31754,7 @@
   <a:extraClrSchemeLst/>
   <a:extLst>
     <a:ext uri="{05A4C25C-085E-4340-85A3-A5531E510DB2}">
-      <thm15:themeFamily xmlns="" xmlns:thm15="http://schemas.microsoft.com/office/thememl/2012/main" name="Office Theme" id="{62F939B6-93AF-4DB8-9C6B-D6C7DFDC589F}" vid="{4A3C46E8-61CC-4603-A589-7422A47A8E4A}"/>
+      <thm15:themeFamily xmlns:thm15="http://schemas.microsoft.com/office/thememl/2012/main" xmlns="" name="Office Theme" id="{62F939B6-93AF-4DB8-9C6B-D6C7DFDC589F}" vid="{4A3C46E8-61CC-4603-A589-7422A47A8E4A}"/>
     </a:ext>
   </a:extLst>
 </a:theme>
@@ -31967,7 +32015,7 @@
   <a:extraClrSchemeLst/>
   <a:extLst>
     <a:ext uri="{05A4C25C-085E-4340-85A3-A5531E510DB2}">
-      <thm15:themeFamily xmlns="" xmlns:thm15="http://schemas.microsoft.com/office/thememl/2012/main" name="Office Theme" id="{62F939B6-93AF-4DB8-9C6B-D6C7DFDC589F}" vid="{4A3C46E8-61CC-4603-A589-7422A47A8E4A}"/>
+      <thm15:themeFamily xmlns:thm15="http://schemas.microsoft.com/office/thememl/2012/main" xmlns="" name="Office Theme" id="{62F939B6-93AF-4DB8-9C6B-D6C7DFDC589F}" vid="{4A3C46E8-61CC-4603-A589-7422A47A8E4A}"/>
     </a:ext>
   </a:extLst>
 </a:theme>
@@ -32228,7 +32276,7 @@
   <a:extraClrSchemeLst/>
   <a:extLst>
     <a:ext uri="{05A4C25C-085E-4340-85A3-A5531E510DB2}">
-      <thm15:themeFamily xmlns="" xmlns:thm15="http://schemas.microsoft.com/office/thememl/2012/main" name="Office Theme" id="{62F939B6-93AF-4DB8-9C6B-D6C7DFDC589F}" vid="{4A3C46E8-61CC-4603-A589-7422A47A8E4A}"/>
+      <thm15:themeFamily xmlns:thm15="http://schemas.microsoft.com/office/thememl/2012/main" xmlns="" name="Office Theme" id="{62F939B6-93AF-4DB8-9C6B-D6C7DFDC589F}" vid="{4A3C46E8-61CC-4603-A589-7422A47A8E4A}"/>
     </a:ext>
   </a:extLst>
 </a:theme>
@@ -32489,7 +32537,7 @@
   <a:extraClrSchemeLst/>
   <a:extLst>
     <a:ext uri="{05A4C25C-085E-4340-85A3-A5531E510DB2}">
-      <thm15:themeFamily xmlns="" xmlns:thm15="http://schemas.microsoft.com/office/thememl/2012/main" name="Office Theme" id="{62F939B6-93AF-4DB8-9C6B-D6C7DFDC589F}" vid="{4A3C46E8-61CC-4603-A589-7422A47A8E4A}"/>
+      <thm15:themeFamily xmlns:thm15="http://schemas.microsoft.com/office/thememl/2012/main" xmlns="" name="Office Theme" id="{62F939B6-93AF-4DB8-9C6B-D6C7DFDC589F}" vid="{4A3C46E8-61CC-4603-A589-7422A47A8E4A}"/>
     </a:ext>
   </a:extLst>
 </a:theme>
@@ -32750,7 +32798,7 @@
   <a:extraClrSchemeLst/>
   <a:extLst>
     <a:ext uri="{05A4C25C-085E-4340-85A3-A5531E510DB2}">
-      <thm15:themeFamily xmlns="" xmlns:thm15="http://schemas.microsoft.com/office/thememl/2012/main" name="Office Theme" id="{62F939B6-93AF-4DB8-9C6B-D6C7DFDC589F}" vid="{4A3C46E8-61CC-4603-A589-7422A47A8E4A}"/>
+      <thm15:themeFamily xmlns:thm15="http://schemas.microsoft.com/office/thememl/2012/main" xmlns="" name="Office Theme" id="{62F939B6-93AF-4DB8-9C6B-D6C7DFDC589F}" vid="{4A3C46E8-61CC-4603-A589-7422A47A8E4A}"/>
     </a:ext>
   </a:extLst>
 </a:theme>
@@ -33011,7 +33059,7 @@
   <a:extraClrSchemeLst/>
   <a:extLst>
     <a:ext uri="{05A4C25C-085E-4340-85A3-A5531E510DB2}">
-      <thm15:themeFamily xmlns="" xmlns:thm15="http://schemas.microsoft.com/office/thememl/2012/main" name="Office Theme" id="{62F939B6-93AF-4DB8-9C6B-D6C7DFDC589F}" vid="{4A3C46E8-61CC-4603-A589-7422A47A8E4A}"/>
+      <thm15:themeFamily xmlns:thm15="http://schemas.microsoft.com/office/thememl/2012/main" xmlns="" name="Office Theme" id="{62F939B6-93AF-4DB8-9C6B-D6C7DFDC589F}" vid="{4A3C46E8-61CC-4603-A589-7422A47A8E4A}"/>
     </a:ext>
   </a:extLst>
 </a:theme>
@@ -33272,7 +33320,7 @@
   <a:extraClrSchemeLst/>
   <a:extLst>
     <a:ext uri="{05A4C25C-085E-4340-85A3-A5531E510DB2}">
-      <thm15:themeFamily xmlns="" xmlns:thm15="http://schemas.microsoft.com/office/thememl/2012/main" name="Office Theme" id="{62F939B6-93AF-4DB8-9C6B-D6C7DFDC589F}" vid="{4A3C46E8-61CC-4603-A589-7422A47A8E4A}"/>
+      <thm15:themeFamily xmlns:thm15="http://schemas.microsoft.com/office/thememl/2012/main" xmlns="" name="Office Theme" id="{62F939B6-93AF-4DB8-9C6B-D6C7DFDC589F}" vid="{4A3C46E8-61CC-4603-A589-7422A47A8E4A}"/>
     </a:ext>
   </a:extLst>
 </a:theme>
@@ -33533,7 +33581,7 @@
   <a:extraClrSchemeLst/>
   <a:extLst>
     <a:ext uri="{05A4C25C-085E-4340-85A3-A5531E510DB2}">
-      <thm15:themeFamily xmlns="" xmlns:thm15="http://schemas.microsoft.com/office/thememl/2012/main" name="Office Theme" id="{62F939B6-93AF-4DB8-9C6B-D6C7DFDC589F}" vid="{4A3C46E8-61CC-4603-A589-7422A47A8E4A}"/>
+      <thm15:themeFamily xmlns:thm15="http://schemas.microsoft.com/office/thememl/2012/main" xmlns="" name="Office Theme" id="{62F939B6-93AF-4DB8-9C6B-D6C7DFDC589F}" vid="{4A3C46E8-61CC-4603-A589-7422A47A8E4A}"/>
     </a:ext>
   </a:extLst>
 </a:theme>
@@ -33794,7 +33842,7 @@
   <a:extraClrSchemeLst/>
   <a:extLst>
     <a:ext uri="{05A4C25C-085E-4340-85A3-A5531E510DB2}">
-      <thm15:themeFamily xmlns="" xmlns:thm15="http://schemas.microsoft.com/office/thememl/2012/main" name="Office Theme" id="{62F939B6-93AF-4DB8-9C6B-D6C7DFDC589F}" vid="{4A3C46E8-61CC-4603-A589-7422A47A8E4A}"/>
+      <thm15:themeFamily xmlns:thm15="http://schemas.microsoft.com/office/thememl/2012/main" xmlns="" name="Office Theme" id="{62F939B6-93AF-4DB8-9C6B-D6C7DFDC589F}" vid="{4A3C46E8-61CC-4603-A589-7422A47A8E4A}"/>
     </a:ext>
   </a:extLst>
 </a:theme>

</xml_diff>